<commit_message>
[docs] add top level system diagram of system and modify chapter '9. Architecture'
add top level system diagram of system and modify chapter '9. Architecture'
</commit_message>
<xml_diff>
--- a/docs/10_implementation/ux_and_callsequence.pptx
+++ b/docs/10_implementation/ux_and_callsequence.pptx
@@ -204,7 +204,7 @@
           <a:p>
             <a:fld id="{7984D211-2FEE-43AF-8F32-B137FFF75FE6}" type="datetimeFigureOut">
               <a:rPr lang="ko-KR" altLang="en-US" smtClean="0"/>
-              <a:t>2021-06-03</a:t>
+              <a:t>2021-06-11</a:t>
             </a:fld>
             <a:endParaRPr lang="ko-KR" altLang="en-US"/>
           </a:p>
@@ -1027,7 +1027,7 @@
           <a:p>
             <a:fld id="{BF9B9A19-508A-4241-B4DD-63F0660416F1}" type="datetimeFigureOut">
               <a:rPr lang="ko-KR" altLang="en-US" smtClean="0"/>
-              <a:t>2021-06-03</a:t>
+              <a:t>2021-06-11</a:t>
             </a:fld>
             <a:endParaRPr lang="ko-KR" altLang="en-US"/>
           </a:p>
@@ -1197,7 +1197,7 @@
           <a:p>
             <a:fld id="{BF9B9A19-508A-4241-B4DD-63F0660416F1}" type="datetimeFigureOut">
               <a:rPr lang="ko-KR" altLang="en-US" smtClean="0"/>
-              <a:t>2021-06-03</a:t>
+              <a:t>2021-06-11</a:t>
             </a:fld>
             <a:endParaRPr lang="ko-KR" altLang="en-US"/>
           </a:p>
@@ -1377,7 +1377,7 @@
           <a:p>
             <a:fld id="{BF9B9A19-508A-4241-B4DD-63F0660416F1}" type="datetimeFigureOut">
               <a:rPr lang="ko-KR" altLang="en-US" smtClean="0"/>
-              <a:t>2021-06-03</a:t>
+              <a:t>2021-06-11</a:t>
             </a:fld>
             <a:endParaRPr lang="ko-KR" altLang="en-US"/>
           </a:p>
@@ -1547,7 +1547,7 @@
           <a:p>
             <a:fld id="{BF9B9A19-508A-4241-B4DD-63F0660416F1}" type="datetimeFigureOut">
               <a:rPr lang="ko-KR" altLang="en-US" smtClean="0"/>
-              <a:t>2021-06-03</a:t>
+              <a:t>2021-06-11</a:t>
             </a:fld>
             <a:endParaRPr lang="ko-KR" altLang="en-US"/>
           </a:p>
@@ -1793,7 +1793,7 @@
           <a:p>
             <a:fld id="{BF9B9A19-508A-4241-B4DD-63F0660416F1}" type="datetimeFigureOut">
               <a:rPr lang="ko-KR" altLang="en-US" smtClean="0"/>
-              <a:t>2021-06-03</a:t>
+              <a:t>2021-06-11</a:t>
             </a:fld>
             <a:endParaRPr lang="ko-KR" altLang="en-US"/>
           </a:p>
@@ -2025,7 +2025,7 @@
           <a:p>
             <a:fld id="{BF9B9A19-508A-4241-B4DD-63F0660416F1}" type="datetimeFigureOut">
               <a:rPr lang="ko-KR" altLang="en-US" smtClean="0"/>
-              <a:t>2021-06-03</a:t>
+              <a:t>2021-06-11</a:t>
             </a:fld>
             <a:endParaRPr lang="ko-KR" altLang="en-US"/>
           </a:p>
@@ -2392,7 +2392,7 @@
           <a:p>
             <a:fld id="{BF9B9A19-508A-4241-B4DD-63F0660416F1}" type="datetimeFigureOut">
               <a:rPr lang="ko-KR" altLang="en-US" smtClean="0"/>
-              <a:t>2021-06-03</a:t>
+              <a:t>2021-06-11</a:t>
             </a:fld>
             <a:endParaRPr lang="ko-KR" altLang="en-US"/>
           </a:p>
@@ -2510,7 +2510,7 @@
           <a:p>
             <a:fld id="{BF9B9A19-508A-4241-B4DD-63F0660416F1}" type="datetimeFigureOut">
               <a:rPr lang="ko-KR" altLang="en-US" smtClean="0"/>
-              <a:t>2021-06-03</a:t>
+              <a:t>2021-06-11</a:t>
             </a:fld>
             <a:endParaRPr lang="ko-KR" altLang="en-US"/>
           </a:p>
@@ -2605,7 +2605,7 @@
           <a:p>
             <a:fld id="{BF9B9A19-508A-4241-B4DD-63F0660416F1}" type="datetimeFigureOut">
               <a:rPr lang="ko-KR" altLang="en-US" smtClean="0"/>
-              <a:t>2021-06-03</a:t>
+              <a:t>2021-06-11</a:t>
             </a:fld>
             <a:endParaRPr lang="ko-KR" altLang="en-US"/>
           </a:p>
@@ -2882,7 +2882,7 @@
           <a:p>
             <a:fld id="{BF9B9A19-508A-4241-B4DD-63F0660416F1}" type="datetimeFigureOut">
               <a:rPr lang="ko-KR" altLang="en-US" smtClean="0"/>
-              <a:t>2021-06-03</a:t>
+              <a:t>2021-06-11</a:t>
             </a:fld>
             <a:endParaRPr lang="ko-KR" altLang="en-US"/>
           </a:p>
@@ -3135,7 +3135,7 @@
           <a:p>
             <a:fld id="{BF9B9A19-508A-4241-B4DD-63F0660416F1}" type="datetimeFigureOut">
               <a:rPr lang="ko-KR" altLang="en-US" smtClean="0"/>
-              <a:t>2021-06-03</a:t>
+              <a:t>2021-06-11</a:t>
             </a:fld>
             <a:endParaRPr lang="ko-KR" altLang="en-US"/>
           </a:p>
@@ -3348,7 +3348,7 @@
           <a:p>
             <a:fld id="{BF9B9A19-508A-4241-B4DD-63F0660416F1}" type="datetimeFigureOut">
               <a:rPr lang="ko-KR" altLang="en-US" smtClean="0"/>
-              <a:t>2021-06-03</a:t>
+              <a:t>2021-06-11</a:t>
             </a:fld>
             <a:endParaRPr lang="ko-KR" altLang="en-US"/>
           </a:p>
@@ -3753,16 +3753,163 @@
           <a:chExt cx="0" cy="0"/>
         </a:xfrm>
       </p:grpSpPr>
-      <p:sp>
-        <p:nvSpPr>
-          <p:cNvPr id="29" name="직사각형 28"/>
+      <p:pic>
+        <p:nvPicPr>
+          <p:cNvPr id="4" name="그림 3"/>
+          <p:cNvPicPr>
+            <a:picLocks noChangeAspect="1"/>
+          </p:cNvPicPr>
+          <p:nvPr/>
+        </p:nvPicPr>
+        <p:blipFill>
+          <a:blip r:embed="rId3"/>
+          <a:stretch>
+            <a:fillRect/>
+          </a:stretch>
+        </p:blipFill>
+        <p:spPr>
+          <a:xfrm>
+            <a:off x="3485785" y="82264"/>
+            <a:ext cx="4507509" cy="1488794"/>
+          </a:xfrm>
+          <a:prstGeom prst="rect">
+            <a:avLst/>
+          </a:prstGeom>
+        </p:spPr>
+      </p:pic>
+      <p:sp>
+        <p:nvSpPr>
+          <p:cNvPr id="5" name="타원 4"/>
           <p:cNvSpPr/>
           <p:nvPr/>
         </p:nvSpPr>
         <p:spPr>
           <a:xfrm>
-            <a:off x="6478068" y="2445817"/>
-            <a:ext cx="4715123" cy="4230094"/>
+            <a:off x="5969432" y="113016"/>
+            <a:ext cx="1243026" cy="914400"/>
+          </a:xfrm>
+          <a:prstGeom prst="ellipse">
+            <a:avLst/>
+          </a:prstGeom>
+          <a:noFill/>
+          <a:ln w="38100">
+            <a:solidFill>
+              <a:srgbClr val="FF0000"/>
+            </a:solidFill>
+            <a:prstDash val="dash"/>
+          </a:ln>
+        </p:spPr>
+        <p:style>
+          <a:lnRef idx="2">
+            <a:schemeClr val="accent1">
+              <a:shade val="50000"/>
+            </a:schemeClr>
+          </a:lnRef>
+          <a:fillRef idx="1">
+            <a:schemeClr val="accent1"/>
+          </a:fillRef>
+          <a:effectRef idx="0">
+            <a:schemeClr val="accent1"/>
+          </a:effectRef>
+          <a:fontRef idx="minor">
+            <a:schemeClr val="lt1"/>
+          </a:fontRef>
+        </p:style>
+        <p:txBody>
+          <a:bodyPr rtlCol="0" anchor="ctr"/>
+          <a:lstStyle/>
+          <a:p>
+            <a:pPr algn="ctr"/>
+            <a:endParaRPr lang="ko-KR" altLang="en-US"/>
+          </a:p>
+        </p:txBody>
+      </p:sp>
+      <p:cxnSp>
+        <p:nvCxnSpPr>
+          <p:cNvPr id="10" name="직선 화살표 연결선 9"/>
+          <p:cNvCxnSpPr>
+            <a:stCxn id="5" idx="4"/>
+          </p:cNvCxnSpPr>
+          <p:nvPr/>
+        </p:nvCxnSpPr>
+        <p:spPr>
+          <a:xfrm>
+            <a:off x="6590945" y="1027416"/>
+            <a:ext cx="1958582" cy="1557260"/>
+          </a:xfrm>
+          <a:prstGeom prst="straightConnector1">
+            <a:avLst/>
+          </a:prstGeom>
+          <a:ln w="57150">
+            <a:solidFill>
+              <a:srgbClr val="FF0000"/>
+            </a:solidFill>
+            <a:tailEnd type="triangle"/>
+          </a:ln>
+        </p:spPr>
+        <p:style>
+          <a:lnRef idx="1">
+            <a:schemeClr val="accent1"/>
+          </a:lnRef>
+          <a:fillRef idx="0">
+            <a:schemeClr val="accent1"/>
+          </a:fillRef>
+          <a:effectRef idx="0">
+            <a:schemeClr val="accent1"/>
+          </a:effectRef>
+          <a:fontRef idx="minor">
+            <a:schemeClr val="tx1"/>
+          </a:fontRef>
+        </p:style>
+      </p:cxnSp>
+      <p:sp>
+        <p:nvSpPr>
+          <p:cNvPr id="80" name="직사각형 79"/>
+          <p:cNvSpPr/>
+          <p:nvPr/>
+        </p:nvSpPr>
+        <p:spPr>
+          <a:xfrm>
+            <a:off x="7019736" y="2663584"/>
+            <a:ext cx="3308685" cy="2731168"/>
+          </a:xfrm>
+          <a:prstGeom prst="rect">
+            <a:avLst/>
+          </a:prstGeom>
+        </p:spPr>
+        <p:style>
+          <a:lnRef idx="2">
+            <a:schemeClr val="accent1"/>
+          </a:lnRef>
+          <a:fillRef idx="1">
+            <a:schemeClr val="lt1"/>
+          </a:fillRef>
+          <a:effectRef idx="0">
+            <a:schemeClr val="accent1"/>
+          </a:effectRef>
+          <a:fontRef idx="minor">
+            <a:schemeClr val="dk1"/>
+          </a:fontRef>
+        </p:style>
+        <p:txBody>
+          <a:bodyPr rtlCol="0" anchor="ctr"/>
+          <a:lstStyle/>
+          <a:p>
+            <a:pPr algn="ctr"/>
+            <a:endParaRPr lang="ko-KR" altLang="en-US" sz="1000"/>
+          </a:p>
+        </p:txBody>
+      </p:sp>
+      <p:sp>
+        <p:nvSpPr>
+          <p:cNvPr id="81" name="직사각형 80"/>
+          <p:cNvSpPr/>
+          <p:nvPr/>
+        </p:nvSpPr>
+        <p:spPr>
+          <a:xfrm>
+            <a:off x="7231670" y="3214660"/>
+            <a:ext cx="1842569" cy="1152073"/>
           </a:xfrm>
           <a:prstGeom prst="rect">
             <a:avLst/>
@@ -3783,27 +3930,66 @@
           </a:fontRef>
         </p:style>
         <p:txBody>
-          <a:bodyPr rtlCol="0" anchor="t"/>
-          <a:lstStyle/>
-          <a:p>
-            <a:r>
-              <a:rPr lang="en-US" altLang="ko-KR" sz="1050" dirty="0" smtClean="0"/>
-              <a:t>status: admin == engineer</a:t>
-            </a:r>
-            <a:endParaRPr lang="ko-KR" altLang="en-US" sz="1050" dirty="0"/>
-          </a:p>
-        </p:txBody>
-      </p:sp>
-      <p:sp>
-        <p:nvSpPr>
-          <p:cNvPr id="6" name="직사각형 5"/>
+          <a:bodyPr rtlCol="0" anchor="ctr"/>
+          <a:lstStyle/>
+          <a:p>
+            <a:pPr algn="ctr"/>
+            <a:r>
+              <a:rPr lang="en-US" altLang="ko-KR" sz="1000" dirty="0" smtClean="0"/>
+              <a:t>Client Program</a:t>
+            </a:r>
+            <a:endParaRPr lang="ko-KR" altLang="en-US" sz="1000" dirty="0"/>
+          </a:p>
+        </p:txBody>
+      </p:sp>
+      <p:sp>
+        <p:nvSpPr>
+          <p:cNvPr id="82" name="직사각형 81"/>
           <p:cNvSpPr/>
           <p:nvPr/>
         </p:nvSpPr>
         <p:spPr>
           <a:xfrm>
-            <a:off x="105019" y="2445817"/>
-            <a:ext cx="4715123" cy="4230094"/>
+            <a:off x="1744578" y="2663584"/>
+            <a:ext cx="3308685" cy="2731168"/>
+          </a:xfrm>
+          <a:prstGeom prst="rect">
+            <a:avLst/>
+          </a:prstGeom>
+        </p:spPr>
+        <p:style>
+          <a:lnRef idx="2">
+            <a:schemeClr val="accent1"/>
+          </a:lnRef>
+          <a:fillRef idx="1">
+            <a:schemeClr val="lt1"/>
+          </a:fillRef>
+          <a:effectRef idx="0">
+            <a:schemeClr val="accent1"/>
+          </a:effectRef>
+          <a:fontRef idx="minor">
+            <a:schemeClr val="dk1"/>
+          </a:fontRef>
+        </p:style>
+        <p:txBody>
+          <a:bodyPr rtlCol="0" anchor="ctr"/>
+          <a:lstStyle/>
+          <a:p>
+            <a:pPr algn="ctr"/>
+            <a:endParaRPr lang="ko-KR" altLang="en-US" sz="1000"/>
+          </a:p>
+        </p:txBody>
+      </p:sp>
+      <p:sp>
+        <p:nvSpPr>
+          <p:cNvPr id="83" name="직사각형 82"/>
+          <p:cNvSpPr/>
+          <p:nvPr/>
+        </p:nvSpPr>
+        <p:spPr>
+          <a:xfrm>
+            <a:off x="2003257" y="3214660"/>
+            <a:ext cx="2643249" cy="1152073"/>
           </a:xfrm>
           <a:prstGeom prst="rect">
             <a:avLst/>
@@ -3824,173 +4010,80 @@
           </a:fontRef>
         </p:style>
         <p:txBody>
-          <a:bodyPr rtlCol="0" anchor="t"/>
-          <a:lstStyle/>
-          <a:p>
-            <a:r>
-              <a:rPr lang="en-US" altLang="ko-KR" sz="1050" dirty="0" smtClean="0"/>
-              <a:t>status: user</a:t>
-            </a:r>
-            <a:endParaRPr lang="ko-KR" altLang="en-US" sz="1050" dirty="0"/>
-          </a:p>
-        </p:txBody>
-      </p:sp>
-      <p:sp>
-        <p:nvSpPr>
-          <p:cNvPr id="8" name="직사각형 7"/>
+          <a:bodyPr rtlCol="0" anchor="ctr"/>
+          <a:lstStyle/>
+          <a:p>
+            <a:pPr algn="ctr"/>
+            <a:r>
+              <a:rPr lang="en-US" altLang="ko-KR" sz="1000" dirty="0" smtClean="0"/>
+              <a:t>Face Recognition</a:t>
+            </a:r>
+          </a:p>
+          <a:p>
+            <a:pPr algn="ctr"/>
+            <a:r>
+              <a:rPr lang="en-US" altLang="ko-KR" sz="1000" dirty="0" smtClean="0"/>
+              <a:t>Sever Program</a:t>
+            </a:r>
+            <a:endParaRPr lang="ko-KR" altLang="en-US" sz="1000" dirty="0"/>
+          </a:p>
+        </p:txBody>
+      </p:sp>
+      <p:pic>
+        <p:nvPicPr>
+          <p:cNvPr id="84" name="Picture 2" descr="https://cdn.shopify.com/s/files/1/0066/9686/1780/products/2_7c4a1818-1eb7-465f-9c1c-74f989ddfd97_1024x.jpg?v=1587523803"/>
+          <p:cNvPicPr>
+            <a:picLocks noChangeAspect="1" noChangeArrowheads="1"/>
+          </p:cNvPicPr>
+          <p:nvPr/>
+        </p:nvPicPr>
+        <p:blipFill>
+          <a:blip r:embed="rId4" cstate="print">
+            <a:extLst>
+              <a:ext uri="{28A0092B-C50C-407E-A947-70E740481C1C}">
+                <a14:useLocalDpi xmlns:a14="http://schemas.microsoft.com/office/drawing/2010/main" val="0"/>
+              </a:ext>
+            </a:extLst>
+          </a:blip>
+          <a:srcRect/>
+          <a:stretch>
+            <a:fillRect/>
+          </a:stretch>
+        </p:blipFill>
+        <p:spPr bwMode="auto">
+          <a:xfrm>
+            <a:off x="1760785" y="2676361"/>
+            <a:ext cx="668362" cy="517981"/>
+          </a:xfrm>
+          <a:prstGeom prst="rect">
+            <a:avLst/>
+          </a:prstGeom>
+          <a:noFill/>
+          <a:extLst>
+            <a:ext uri="{909E8E84-426E-40DD-AFC4-6F175D3DCCD1}">
+              <a14:hiddenFill xmlns:a14="http://schemas.microsoft.com/office/drawing/2010/main">
+                <a:solidFill>
+                  <a:srgbClr val="FFFFFF"/>
+                </a:solidFill>
+              </a14:hiddenFill>
+            </a:ext>
+          </a:extLst>
+        </p:spPr>
+      </p:pic>
+      <p:sp>
+        <p:nvSpPr>
+          <p:cNvPr id="85" name="순서도: 자기 디스크 84"/>
           <p:cNvSpPr/>
           <p:nvPr/>
         </p:nvSpPr>
         <p:spPr>
           <a:xfrm>
-            <a:off x="407679" y="3355059"/>
-            <a:ext cx="3152266" cy="3165854"/>
-          </a:xfrm>
-          <a:prstGeom prst="rect">
-            <a:avLst/>
-          </a:prstGeom>
-        </p:spPr>
-        <p:style>
-          <a:lnRef idx="2">
-            <a:schemeClr val="accent1">
-              <a:shade val="50000"/>
-            </a:schemeClr>
-          </a:lnRef>
-          <a:fillRef idx="1">
-            <a:schemeClr val="accent1"/>
-          </a:fillRef>
-          <a:effectRef idx="0">
-            <a:schemeClr val="accent1"/>
-          </a:effectRef>
-          <a:fontRef idx="minor">
-            <a:schemeClr val="lt1"/>
-          </a:fontRef>
-        </p:style>
-        <p:txBody>
-          <a:bodyPr rtlCol="0" anchor="ctr"/>
-          <a:lstStyle/>
-          <a:p>
-            <a:pPr algn="ctr"/>
-            <a:r>
-              <a:rPr lang="en-US" altLang="ko-KR" sz="1050" dirty="0" smtClean="0"/>
-              <a:t>Photo</a:t>
-            </a:r>
-          </a:p>
-          <a:p>
-            <a:pPr algn="ctr"/>
-            <a:r>
-              <a:rPr lang="en-US" altLang="ko-KR" sz="1050" dirty="0" smtClean="0"/>
-              <a:t>streaming</a:t>
-            </a:r>
-            <a:endParaRPr lang="ko-KR" altLang="en-US" sz="1050" dirty="0"/>
-          </a:p>
-        </p:txBody>
-      </p:sp>
-      <p:sp>
-        <p:nvSpPr>
-          <p:cNvPr id="18" name="직사각형 17"/>
-          <p:cNvSpPr/>
-          <p:nvPr/>
-        </p:nvSpPr>
-        <p:spPr>
-          <a:xfrm>
-            <a:off x="5037277" y="2576473"/>
-            <a:ext cx="932155" cy="521351"/>
-          </a:xfrm>
-          <a:prstGeom prst="rect">
-            <a:avLst/>
-          </a:prstGeom>
-        </p:spPr>
-        <p:style>
-          <a:lnRef idx="2">
-            <a:schemeClr val="accent1">
-              <a:shade val="50000"/>
-            </a:schemeClr>
-          </a:lnRef>
-          <a:fillRef idx="1">
-            <a:schemeClr val="accent1"/>
-          </a:fillRef>
-          <a:effectRef idx="0">
-            <a:schemeClr val="accent1"/>
-          </a:effectRef>
-          <a:fontRef idx="minor">
-            <a:schemeClr val="lt1"/>
-          </a:fontRef>
-        </p:style>
-        <p:txBody>
-          <a:bodyPr rtlCol="0" anchor="ctr"/>
-          <a:lstStyle/>
-          <a:p>
-            <a:pPr algn="ctr"/>
-            <a:r>
-              <a:rPr lang="en-US" altLang="ko-KR" sz="1050" dirty="0" smtClean="0"/>
-              <a:t>admin password input</a:t>
-            </a:r>
-            <a:endParaRPr lang="ko-KR" altLang="en-US" sz="1050" dirty="0"/>
-          </a:p>
-        </p:txBody>
-      </p:sp>
-      <p:sp>
-        <p:nvSpPr>
-          <p:cNvPr id="23" name="직사각형 22"/>
-          <p:cNvSpPr/>
-          <p:nvPr/>
-        </p:nvSpPr>
-        <p:spPr>
-          <a:xfrm>
-            <a:off x="5037277" y="3415625"/>
-            <a:ext cx="932155" cy="355107"/>
-          </a:xfrm>
-          <a:prstGeom prst="rect">
-            <a:avLst/>
-          </a:prstGeom>
-        </p:spPr>
-        <p:style>
-          <a:lnRef idx="2">
-            <a:schemeClr val="accent1">
-              <a:shade val="50000"/>
-            </a:schemeClr>
-          </a:lnRef>
-          <a:fillRef idx="1">
-            <a:schemeClr val="accent1"/>
-          </a:fillRef>
-          <a:effectRef idx="0">
-            <a:schemeClr val="accent1"/>
-          </a:effectRef>
-          <a:fontRef idx="minor">
-            <a:schemeClr val="lt1"/>
-          </a:fontRef>
-        </p:style>
-        <p:txBody>
-          <a:bodyPr rtlCol="0" anchor="ctr"/>
-          <a:lstStyle/>
-          <a:p>
-            <a:pPr algn="ctr"/>
-            <a:r>
-              <a:rPr lang="en-US" altLang="ko-KR" sz="1050" dirty="0" smtClean="0"/>
-              <a:t>admin face recognition</a:t>
-            </a:r>
-            <a:endParaRPr lang="ko-KR" altLang="en-US" sz="1050" dirty="0"/>
-          </a:p>
-        </p:txBody>
-      </p:sp>
-      <p:sp>
-        <p:nvSpPr>
-          <p:cNvPr id="24" name="직사각형 23"/>
-          <p:cNvSpPr/>
-          <p:nvPr/>
-        </p:nvSpPr>
-        <p:spPr>
-          <a:xfrm>
-            <a:off x="3646178" y="2548295"/>
-            <a:ext cx="932155" cy="355107"/>
-          </a:xfrm>
-          <a:prstGeom prst="rect">
-            <a:avLst/>
-          </a:prstGeom>
-          <a:ln>
-            <a:prstDash val="dash"/>
-          </a:ln>
+            <a:off x="2003257" y="4435683"/>
+            <a:ext cx="2643249" cy="922720"/>
+          </a:xfrm>
+          <a:prstGeom prst="flowChartMagneticDisk">
+            <a:avLst/>
+          </a:prstGeom>
         </p:spPr>
         <p:style>
           <a:lnRef idx="2">
@@ -4007,194 +4100,23 @@
           </a:fontRef>
         </p:style>
         <p:txBody>
-          <a:bodyPr rtlCol="0" anchor="ctr"/>
-          <a:lstStyle/>
-          <a:p>
-            <a:pPr algn="ctr"/>
-            <a:r>
-              <a:rPr lang="en-US" altLang="ko-KR" sz="1050" dirty="0" smtClean="0"/>
-              <a:t>hidden key input</a:t>
-            </a:r>
-            <a:endParaRPr lang="ko-KR" altLang="en-US" sz="1050" dirty="0"/>
-          </a:p>
-        </p:txBody>
-      </p:sp>
-      <p:cxnSp>
-        <p:nvCxnSpPr>
-          <p:cNvPr id="7" name="직선 화살표 연결선 6"/>
-          <p:cNvCxnSpPr>
-            <a:stCxn id="24" idx="3"/>
-            <a:endCxn id="18" idx="1"/>
-          </p:cNvCxnSpPr>
-          <p:nvPr/>
-        </p:nvCxnSpPr>
-        <p:spPr>
-          <a:xfrm>
-            <a:off x="4578333" y="2725849"/>
-            <a:ext cx="458944" cy="111300"/>
-          </a:xfrm>
-          <a:prstGeom prst="straightConnector1">
-            <a:avLst/>
-          </a:prstGeom>
-          <a:ln>
-            <a:tailEnd type="triangle"/>
-          </a:ln>
-        </p:spPr>
-        <p:style>
-          <a:lnRef idx="1">
-            <a:schemeClr val="accent1"/>
-          </a:lnRef>
-          <a:fillRef idx="0">
-            <a:schemeClr val="accent1"/>
-          </a:fillRef>
-          <a:effectRef idx="0">
-            <a:schemeClr val="accent1"/>
-          </a:effectRef>
-          <a:fontRef idx="minor">
-            <a:schemeClr val="tx1"/>
-          </a:fontRef>
-        </p:style>
-      </p:cxnSp>
-      <p:sp>
-        <p:nvSpPr>
-          <p:cNvPr id="31" name="직사각형 30"/>
-          <p:cNvSpPr/>
-          <p:nvPr/>
-        </p:nvSpPr>
-        <p:spPr>
-          <a:xfrm>
-            <a:off x="10075037" y="2538531"/>
-            <a:ext cx="932155" cy="355107"/>
-          </a:xfrm>
-          <a:prstGeom prst="rect">
-            <a:avLst/>
-          </a:prstGeom>
-        </p:spPr>
-        <p:style>
-          <a:lnRef idx="2">
-            <a:schemeClr val="accent1">
-              <a:shade val="50000"/>
-            </a:schemeClr>
-          </a:lnRef>
-          <a:fillRef idx="1">
-            <a:schemeClr val="accent1"/>
-          </a:fillRef>
-          <a:effectRef idx="0">
-            <a:schemeClr val="accent1"/>
-          </a:effectRef>
-          <a:fontRef idx="minor">
-            <a:schemeClr val="lt1"/>
-          </a:fontRef>
-        </p:style>
-        <p:txBody>
-          <a:bodyPr rtlCol="0" anchor="ctr"/>
-          <a:lstStyle/>
-          <a:p>
-            <a:pPr algn="ctr"/>
-            <a:r>
-              <a:rPr lang="en-US" altLang="ko-KR" sz="1050" dirty="0" smtClean="0"/>
-              <a:t>logout</a:t>
-            </a:r>
-            <a:endParaRPr lang="ko-KR" altLang="en-US" sz="1050" dirty="0"/>
-          </a:p>
-        </p:txBody>
-      </p:sp>
-      <p:sp>
-        <p:nvSpPr>
-          <p:cNvPr id="32" name="직사각형 31"/>
-          <p:cNvSpPr/>
-          <p:nvPr/>
-        </p:nvSpPr>
-        <p:spPr>
-          <a:xfrm>
-            <a:off x="6649373" y="3355059"/>
-            <a:ext cx="3152266" cy="3165854"/>
-          </a:xfrm>
-          <a:prstGeom prst="rect">
-            <a:avLst/>
-          </a:prstGeom>
-        </p:spPr>
-        <p:style>
-          <a:lnRef idx="2">
-            <a:schemeClr val="accent1">
-              <a:shade val="50000"/>
-            </a:schemeClr>
-          </a:lnRef>
-          <a:fillRef idx="1">
-            <a:schemeClr val="accent1"/>
-          </a:fillRef>
-          <a:effectRef idx="0">
-            <a:schemeClr val="accent1"/>
-          </a:effectRef>
-          <a:fontRef idx="minor">
-            <a:schemeClr val="lt1"/>
-          </a:fontRef>
-        </p:style>
-        <p:txBody>
-          <a:bodyPr rtlCol="0" anchor="ctr"/>
-          <a:lstStyle/>
-          <a:p>
-            <a:pPr algn="ctr"/>
-            <a:r>
-              <a:rPr lang="en-US" altLang="ko-KR" sz="1050" dirty="0" smtClean="0"/>
-              <a:t>Photo</a:t>
-            </a:r>
-          </a:p>
-          <a:p>
-            <a:pPr algn="ctr"/>
-            <a:r>
-              <a:rPr lang="en-US" altLang="ko-KR" sz="1050" dirty="0" smtClean="0"/>
-              <a:t>streaming</a:t>
-            </a:r>
-            <a:endParaRPr lang="ko-KR" altLang="en-US" sz="1050" dirty="0"/>
-          </a:p>
-        </p:txBody>
-      </p:sp>
-      <p:cxnSp>
-        <p:nvCxnSpPr>
-          <p:cNvPr id="26" name="직선 화살표 연결선 25"/>
-          <p:cNvCxnSpPr>
-            <a:stCxn id="23" idx="3"/>
-          </p:cNvCxnSpPr>
-          <p:nvPr/>
-        </p:nvCxnSpPr>
-        <p:spPr>
-          <a:xfrm flipV="1">
-            <a:off x="5969432" y="2801639"/>
-            <a:ext cx="679941" cy="791540"/>
-          </a:xfrm>
-          <a:prstGeom prst="straightConnector1">
-            <a:avLst/>
-          </a:prstGeom>
-          <a:ln>
-            <a:tailEnd type="triangle"/>
-          </a:ln>
-        </p:spPr>
-        <p:style>
-          <a:lnRef idx="1">
-            <a:schemeClr val="accent1"/>
-          </a:lnRef>
-          <a:fillRef idx="0">
-            <a:schemeClr val="accent1"/>
-          </a:fillRef>
-          <a:effectRef idx="0">
-            <a:schemeClr val="accent1"/>
-          </a:effectRef>
-          <a:fontRef idx="minor">
-            <a:schemeClr val="tx1"/>
-          </a:fontRef>
-        </p:style>
-      </p:cxnSp>
-      <p:sp>
-        <p:nvSpPr>
-          <p:cNvPr id="41" name="TextBox 40"/>
+          <a:bodyPr wrap="none" rtlCol="0" anchor="t"/>
+          <a:lstStyle/>
+          <a:p>
+            <a:endParaRPr lang="en-US" altLang="ko-KR" sz="1000" dirty="0" smtClean="0"/>
+          </a:p>
+        </p:txBody>
+      </p:sp>
+      <p:sp>
+        <p:nvSpPr>
+          <p:cNvPr id="86" name="TextBox 85"/>
           <p:cNvSpPr txBox="1"/>
           <p:nvPr/>
         </p:nvSpPr>
         <p:spPr>
           <a:xfrm>
-            <a:off x="5342633" y="3050926"/>
-            <a:ext cx="346570" cy="369332"/>
+            <a:off x="2953002" y="4419189"/>
+            <a:ext cx="803425" cy="349946"/>
           </a:xfrm>
           <a:prstGeom prst="rect">
             <a:avLst/>
@@ -4208,213 +4130,292 @@
           <a:lstStyle/>
           <a:p>
             <a:r>
-              <a:rPr lang="en-US" altLang="ko-KR" dirty="0" smtClean="0"/>
-              <a:t>+</a:t>
-            </a:r>
-            <a:endParaRPr lang="ko-KR" altLang="en-US" dirty="0"/>
-          </a:p>
-        </p:txBody>
-      </p:sp>
-      <p:sp>
-        <p:nvSpPr>
-          <p:cNvPr id="47" name="직사각형 46"/>
+              <a:rPr lang="en-US" altLang="ko-KR" sz="1000" dirty="0" smtClean="0"/>
+              <a:t>file system</a:t>
+            </a:r>
+          </a:p>
+        </p:txBody>
+      </p:sp>
+      <p:sp>
+        <p:nvSpPr>
+          <p:cNvPr id="87" name="대각선 방향의 모서리가 잘린 사각형 86"/>
           <p:cNvSpPr/>
           <p:nvPr/>
         </p:nvSpPr>
         <p:spPr>
           <a:xfrm>
-            <a:off x="447357" y="2895929"/>
-            <a:ext cx="2017319" cy="355107"/>
-          </a:xfrm>
-          <a:prstGeom prst="rect">
-            <a:avLst/>
+            <a:off x="2255165" y="4769135"/>
+            <a:ext cx="288000" cy="234616"/>
+          </a:xfrm>
+          <a:prstGeom prst="snip2DiagRect">
+            <a:avLst>
+              <a:gd name="adj1" fmla="val 0"/>
+              <a:gd name="adj2" fmla="val 26316"/>
+            </a:avLst>
           </a:prstGeom>
         </p:spPr>
         <p:style>
           <a:lnRef idx="2">
-            <a:schemeClr val="accent1">
-              <a:shade val="50000"/>
-            </a:schemeClr>
+            <a:schemeClr val="accent3"/>
           </a:lnRef>
           <a:fillRef idx="1">
-            <a:schemeClr val="accent1"/>
+            <a:schemeClr val="lt1"/>
           </a:fillRef>
           <a:effectRef idx="0">
-            <a:schemeClr val="accent1"/>
+            <a:schemeClr val="accent3"/>
           </a:effectRef>
           <a:fontRef idx="minor">
-            <a:schemeClr val="lt1"/>
+            <a:schemeClr val="dk1"/>
           </a:fontRef>
         </p:style>
         <p:txBody>
-          <a:bodyPr rtlCol="0" anchor="ctr"/>
+          <a:bodyPr wrap="none" rtlCol="0" anchor="ctr"/>
           <a:lstStyle/>
           <a:p>
             <a:pPr algn="ctr"/>
             <a:r>
-              <a:rPr lang="en-US" altLang="ko-KR" sz="1050" dirty="0" smtClean="0"/>
-              <a:t>IP</a:t>
-            </a:r>
-            <a:endParaRPr lang="ko-KR" altLang="en-US" sz="1050" dirty="0"/>
-          </a:p>
-        </p:txBody>
-      </p:sp>
-      <p:sp>
-        <p:nvSpPr>
-          <p:cNvPr id="49" name="직사각형 48"/>
+              <a:rPr lang="en-US" altLang="ko-KR" sz="1000" dirty="0" smtClean="0"/>
+              <a:t>CRT</a:t>
+            </a:r>
+            <a:endParaRPr lang="ko-KR" altLang="en-US" sz="1000" dirty="0"/>
+          </a:p>
+        </p:txBody>
+      </p:sp>
+      <p:sp>
+        <p:nvSpPr>
+          <p:cNvPr id="88" name="대각선 방향의 모서리가 잘린 사각형 87"/>
           <p:cNvSpPr/>
           <p:nvPr/>
         </p:nvSpPr>
         <p:spPr>
           <a:xfrm>
-            <a:off x="2617870" y="2599029"/>
-            <a:ext cx="932155" cy="652007"/>
-          </a:xfrm>
-          <a:prstGeom prst="rect">
-            <a:avLst/>
+            <a:off x="2609558" y="4779735"/>
+            <a:ext cx="288000" cy="234616"/>
+          </a:xfrm>
+          <a:prstGeom prst="snip2DiagRect">
+            <a:avLst>
+              <a:gd name="adj1" fmla="val 0"/>
+              <a:gd name="adj2" fmla="val 26316"/>
+            </a:avLst>
           </a:prstGeom>
         </p:spPr>
         <p:style>
           <a:lnRef idx="2">
-            <a:schemeClr val="accent1">
-              <a:shade val="50000"/>
-            </a:schemeClr>
+            <a:schemeClr val="accent3"/>
           </a:lnRef>
           <a:fillRef idx="1">
-            <a:schemeClr val="accent1"/>
+            <a:schemeClr val="lt1"/>
           </a:fillRef>
           <a:effectRef idx="0">
-            <a:schemeClr val="accent1"/>
+            <a:schemeClr val="accent3"/>
           </a:effectRef>
           <a:fontRef idx="minor">
-            <a:schemeClr val="lt1"/>
+            <a:schemeClr val="dk1"/>
           </a:fontRef>
         </p:style>
         <p:txBody>
-          <a:bodyPr rtlCol="0" anchor="ctr"/>
+          <a:bodyPr wrap="none" rtlCol="0" anchor="ctr"/>
           <a:lstStyle/>
           <a:p>
             <a:pPr algn="ctr"/>
             <a:r>
-              <a:rPr lang="en-US" altLang="ko-KR" sz="1050" dirty="0" smtClean="0"/>
-              <a:t>connect</a:t>
-            </a:r>
-          </a:p>
-          <a:p>
-            <a:pPr algn="ctr"/>
-            <a:r>
-              <a:rPr lang="en-US" altLang="ko-KR" sz="1050" dirty="0" smtClean="0"/>
-              <a:t>&lt;&gt; disconnect toggle</a:t>
-            </a:r>
-            <a:endParaRPr lang="ko-KR" altLang="en-US" sz="1050" dirty="0"/>
-          </a:p>
-        </p:txBody>
-      </p:sp>
-      <p:sp>
-        <p:nvSpPr>
-          <p:cNvPr id="25" name="직사각형 24"/>
+              <a:rPr lang="en-US" altLang="ko-KR" sz="1000" dirty="0" smtClean="0"/>
+              <a:t>Key</a:t>
+            </a:r>
+            <a:endParaRPr lang="ko-KR" altLang="en-US" sz="1000" dirty="0"/>
+          </a:p>
+        </p:txBody>
+      </p:sp>
+      <p:sp>
+        <p:nvSpPr>
+          <p:cNvPr id="89" name="대각선 방향의 모서리가 잘린 사각형 88"/>
           <p:cNvSpPr/>
           <p:nvPr/>
         </p:nvSpPr>
         <p:spPr>
           <a:xfrm>
-            <a:off x="6690007" y="2895929"/>
-            <a:ext cx="2017319" cy="355107"/>
-          </a:xfrm>
-          <a:prstGeom prst="rect">
-            <a:avLst/>
+            <a:off x="2990998" y="4779735"/>
+            <a:ext cx="485776" cy="234616"/>
+          </a:xfrm>
+          <a:prstGeom prst="snip2DiagRect">
+            <a:avLst>
+              <a:gd name="adj1" fmla="val 0"/>
+              <a:gd name="adj2" fmla="val 26316"/>
+            </a:avLst>
           </a:prstGeom>
         </p:spPr>
         <p:style>
           <a:lnRef idx="2">
-            <a:schemeClr val="accent1">
-              <a:shade val="50000"/>
-            </a:schemeClr>
+            <a:schemeClr val="accent3"/>
           </a:lnRef>
           <a:fillRef idx="1">
-            <a:schemeClr val="accent1"/>
+            <a:schemeClr val="lt1"/>
           </a:fillRef>
           <a:effectRef idx="0">
-            <a:schemeClr val="accent1"/>
+            <a:schemeClr val="accent3"/>
           </a:effectRef>
           <a:fontRef idx="minor">
-            <a:schemeClr val="lt1"/>
+            <a:schemeClr val="dk1"/>
           </a:fontRef>
         </p:style>
         <p:txBody>
-          <a:bodyPr rtlCol="0" anchor="ctr"/>
+          <a:bodyPr wrap="none" rtlCol="0" anchor="ctr"/>
           <a:lstStyle/>
           <a:p>
             <a:pPr algn="ctr"/>
             <a:r>
-              <a:rPr lang="en-US" altLang="ko-KR" sz="1050" dirty="0" smtClean="0"/>
-              <a:t>IP</a:t>
-            </a:r>
-            <a:endParaRPr lang="ko-KR" altLang="en-US" sz="1050" dirty="0"/>
-          </a:p>
-        </p:txBody>
-      </p:sp>
-      <p:sp>
-        <p:nvSpPr>
-          <p:cNvPr id="28" name="직사각형 27"/>
+              <a:rPr lang="en-US" altLang="ko-KR" sz="1000" dirty="0" smtClean="0"/>
+              <a:t>CA CRT</a:t>
+            </a:r>
+            <a:endParaRPr lang="ko-KR" altLang="en-US" sz="1000" dirty="0"/>
+          </a:p>
+        </p:txBody>
+      </p:sp>
+      <p:sp>
+        <p:nvSpPr>
+          <p:cNvPr id="90" name="대각선 방향의 모서리가 잘린 사각형 89"/>
           <p:cNvSpPr/>
           <p:nvPr/>
         </p:nvSpPr>
         <p:spPr>
           <a:xfrm>
-            <a:off x="8860520" y="2599029"/>
-            <a:ext cx="932155" cy="652007"/>
-          </a:xfrm>
-          <a:prstGeom prst="rect">
-            <a:avLst/>
+            <a:off x="2576913" y="5064744"/>
+            <a:ext cx="720000" cy="234616"/>
+          </a:xfrm>
+          <a:prstGeom prst="snip2DiagRect">
+            <a:avLst>
+              <a:gd name="adj1" fmla="val 0"/>
+              <a:gd name="adj2" fmla="val 26316"/>
+            </a:avLst>
           </a:prstGeom>
         </p:spPr>
         <p:style>
           <a:lnRef idx="2">
-            <a:schemeClr val="accent1">
-              <a:shade val="50000"/>
-            </a:schemeClr>
+            <a:schemeClr val="accent3"/>
           </a:lnRef>
           <a:fillRef idx="1">
-            <a:schemeClr val="accent1"/>
+            <a:schemeClr val="lt1"/>
           </a:fillRef>
           <a:effectRef idx="0">
-            <a:schemeClr val="accent1"/>
+            <a:schemeClr val="accent3"/>
           </a:effectRef>
           <a:fontRef idx="minor">
-            <a:schemeClr val="lt1"/>
+            <a:schemeClr val="dk1"/>
           </a:fontRef>
         </p:style>
         <p:txBody>
-          <a:bodyPr rtlCol="0" anchor="ctr"/>
+          <a:bodyPr wrap="none" rtlCol="0" anchor="ctr"/>
           <a:lstStyle/>
           <a:p>
             <a:pPr algn="ctr"/>
             <a:r>
-              <a:rPr lang="en-US" altLang="ko-KR" sz="1050" dirty="0" smtClean="0"/>
-              <a:t>connect</a:t>
-            </a:r>
-          </a:p>
+              <a:rPr lang="en-US" altLang="ko-KR" sz="1000" dirty="0" smtClean="0"/>
+              <a:t>Face Image</a:t>
+            </a:r>
+            <a:endParaRPr lang="ko-KR" altLang="en-US" sz="1000" dirty="0"/>
+          </a:p>
+        </p:txBody>
+      </p:sp>
+      <p:sp>
+        <p:nvSpPr>
+          <p:cNvPr id="91" name="대각선 방향의 모서리가 잘린 사각형 90"/>
+          <p:cNvSpPr/>
+          <p:nvPr/>
+        </p:nvSpPr>
+        <p:spPr>
+          <a:xfrm>
+            <a:off x="3585780" y="4799631"/>
+            <a:ext cx="864000" cy="234616"/>
+          </a:xfrm>
+          <a:prstGeom prst="snip2DiagRect">
+            <a:avLst>
+              <a:gd name="adj1" fmla="val 0"/>
+              <a:gd name="adj2" fmla="val 26316"/>
+            </a:avLst>
+          </a:prstGeom>
+        </p:spPr>
+        <p:style>
+          <a:lnRef idx="2">
+            <a:schemeClr val="accent3"/>
+          </a:lnRef>
+          <a:fillRef idx="1">
+            <a:schemeClr val="lt1"/>
+          </a:fillRef>
+          <a:effectRef idx="0">
+            <a:schemeClr val="accent3"/>
+          </a:effectRef>
+          <a:fontRef idx="minor">
+            <a:schemeClr val="dk1"/>
+          </a:fontRef>
+        </p:style>
+        <p:txBody>
+          <a:bodyPr wrap="none" rtlCol="0" anchor="ctr"/>
+          <a:lstStyle/>
           <a:p>
             <a:pPr algn="ctr"/>
             <a:r>
-              <a:rPr lang="en-US" altLang="ko-KR" sz="1050" dirty="0" smtClean="0"/>
-              <a:t>&lt;&gt; disconnect toggle</a:t>
-            </a:r>
-            <a:endParaRPr lang="ko-KR" altLang="en-US" sz="1050" dirty="0"/>
-          </a:p>
-        </p:txBody>
-      </p:sp>
-      <p:sp>
-        <p:nvSpPr>
-          <p:cNvPr id="35" name="직사각형 34"/>
+              <a:rPr lang="en-US" altLang="ko-KR" sz="1000" dirty="0" smtClean="0"/>
+              <a:t>Friends video</a:t>
+            </a:r>
+            <a:endParaRPr lang="ko-KR" altLang="en-US" sz="1000" dirty="0"/>
+          </a:p>
+        </p:txBody>
+      </p:sp>
+      <p:sp>
+        <p:nvSpPr>
+          <p:cNvPr id="92" name="대각선 방향의 모서리가 잘린 사각형 91"/>
           <p:cNvSpPr/>
           <p:nvPr/>
         </p:nvSpPr>
         <p:spPr>
           <a:xfrm>
-            <a:off x="10005748" y="5590262"/>
-            <a:ext cx="2068498" cy="1142995"/>
+            <a:off x="3407569" y="5078221"/>
+            <a:ext cx="612000" cy="234616"/>
+          </a:xfrm>
+          <a:prstGeom prst="snip2DiagRect">
+            <a:avLst>
+              <a:gd name="adj1" fmla="val 0"/>
+              <a:gd name="adj2" fmla="val 26316"/>
+            </a:avLst>
+          </a:prstGeom>
+        </p:spPr>
+        <p:style>
+          <a:lnRef idx="2">
+            <a:schemeClr val="accent3"/>
+          </a:lnRef>
+          <a:fillRef idx="1">
+            <a:schemeClr val="lt1"/>
+          </a:fillRef>
+          <a:effectRef idx="0">
+            <a:schemeClr val="accent3"/>
+          </a:effectRef>
+          <a:fontRef idx="minor">
+            <a:schemeClr val="dk1"/>
+          </a:fontRef>
+        </p:style>
+        <p:txBody>
+          <a:bodyPr wrap="none" rtlCol="0" anchor="ctr"/>
+          <a:lstStyle/>
+          <a:p>
+            <a:pPr algn="ctr"/>
+            <a:r>
+              <a:rPr lang="en-US" altLang="ko-KR" sz="1000" dirty="0" smtClean="0"/>
+              <a:t>Login info</a:t>
+            </a:r>
+            <a:endParaRPr lang="ko-KR" altLang="en-US" sz="1000" dirty="0"/>
+          </a:p>
+        </p:txBody>
+      </p:sp>
+      <p:sp>
+        <p:nvSpPr>
+          <p:cNvPr id="93" name="직사각형 92"/>
+          <p:cNvSpPr/>
+          <p:nvPr/>
+        </p:nvSpPr>
+        <p:spPr>
+          <a:xfrm>
+            <a:off x="1353552" y="3577984"/>
+            <a:ext cx="782052" cy="282742"/>
           </a:xfrm>
           <a:prstGeom prst="rect">
             <a:avLst/>
@@ -4438,34 +4439,384 @@
           <a:bodyPr rtlCol="0" anchor="ctr"/>
           <a:lstStyle/>
           <a:p>
-            <a:pPr algn="r"/>
-            <a:r>
-              <a:rPr lang="en-US" altLang="ko-KR" sz="1050" dirty="0" smtClean="0"/>
-              <a:t>secure</a:t>
-            </a:r>
-          </a:p>
-          <a:p>
-            <a:pPr algn="r"/>
-            <a:r>
-              <a:rPr lang="en-US" altLang="ko-KR" sz="1050" dirty="0" smtClean="0"/>
-              <a:t>mode</a:t>
-            </a:r>
-            <a:endParaRPr lang="ko-KR" altLang="en-US" sz="1050" dirty="0"/>
-          </a:p>
-        </p:txBody>
-      </p:sp>
-      <p:sp>
-        <p:nvSpPr>
-          <p:cNvPr id="36" name="직사각형 35"/>
+            <a:pPr algn="ctr"/>
+            <a:r>
+              <a:rPr lang="en-US" altLang="ko-KR" sz="1000" dirty="0" smtClean="0"/>
+              <a:t>camera</a:t>
+            </a:r>
+            <a:endParaRPr lang="ko-KR" altLang="en-US" sz="1000" dirty="0"/>
+          </a:p>
+        </p:txBody>
+      </p:sp>
+      <p:grpSp>
+        <p:nvGrpSpPr>
+          <p:cNvPr id="94" name="그룹 93"/>
+          <p:cNvGrpSpPr/>
+          <p:nvPr/>
+        </p:nvGrpSpPr>
+        <p:grpSpPr>
+          <a:xfrm>
+            <a:off x="4376487" y="3038466"/>
+            <a:ext cx="3125202" cy="1213731"/>
+            <a:chOff x="4376487" y="1156935"/>
+            <a:chExt cx="3726782" cy="1213731"/>
+          </a:xfrm>
+        </p:grpSpPr>
+        <p:sp>
+          <p:nvSpPr>
+            <p:cNvPr id="95" name="직사각형 94"/>
+            <p:cNvSpPr/>
+            <p:nvPr/>
+          </p:nvSpPr>
+          <p:spPr>
+            <a:xfrm>
+              <a:off x="4376487" y="1402079"/>
+              <a:ext cx="3726782" cy="968587"/>
+            </a:xfrm>
+            <a:prstGeom prst="rect">
+              <a:avLst/>
+            </a:prstGeom>
+            <a:noFill/>
+            <a:ln>
+              <a:prstDash val="dash"/>
+            </a:ln>
+          </p:spPr>
+          <p:style>
+            <a:lnRef idx="2">
+              <a:schemeClr val="accent6"/>
+            </a:lnRef>
+            <a:fillRef idx="1">
+              <a:schemeClr val="lt1"/>
+            </a:fillRef>
+            <a:effectRef idx="0">
+              <a:schemeClr val="accent6"/>
+            </a:effectRef>
+            <a:fontRef idx="minor">
+              <a:schemeClr val="dk1"/>
+            </a:fontRef>
+          </p:style>
+          <p:txBody>
+            <a:bodyPr rtlCol="0" anchor="t"/>
+            <a:lstStyle/>
+            <a:p>
+              <a:pPr algn="ctr"/>
+              <a:endParaRPr lang="ko-KR" altLang="en-US" sz="1000" dirty="0"/>
+            </a:p>
+          </p:txBody>
+        </p:sp>
+        <p:sp>
+          <p:nvSpPr>
+            <p:cNvPr id="96" name="왼쪽/오른쪽 화살표 95"/>
+            <p:cNvSpPr/>
+            <p:nvPr/>
+          </p:nvSpPr>
+          <p:spPr>
+            <a:xfrm>
+              <a:off x="4439878" y="1504897"/>
+              <a:ext cx="3600000" cy="216000"/>
+            </a:xfrm>
+            <a:prstGeom prst="leftRightArrow">
+              <a:avLst>
+                <a:gd name="adj1" fmla="val 72630"/>
+                <a:gd name="adj2" fmla="val 35104"/>
+              </a:avLst>
+            </a:prstGeom>
+          </p:spPr>
+          <p:style>
+            <a:lnRef idx="2">
+              <a:schemeClr val="accent6"/>
+            </a:lnRef>
+            <a:fillRef idx="1">
+              <a:schemeClr val="lt1"/>
+            </a:fillRef>
+            <a:effectRef idx="0">
+              <a:schemeClr val="accent6"/>
+            </a:effectRef>
+            <a:fontRef idx="minor">
+              <a:schemeClr val="dk1"/>
+            </a:fontRef>
+          </p:style>
+          <p:txBody>
+            <a:bodyPr rtlCol="0" anchor="ctr"/>
+            <a:lstStyle/>
+            <a:p>
+              <a:pPr algn="ctr"/>
+              <a:r>
+                <a:rPr lang="en-US" altLang="ko-KR" sz="1000" dirty="0" smtClean="0"/>
+                <a:t>secure channel for </a:t>
+              </a:r>
+              <a:r>
+                <a:rPr lang="en-US" altLang="ko-KR" sz="1000" dirty="0" smtClean="0"/>
+                <a:t>control data</a:t>
+              </a:r>
+              <a:endParaRPr lang="ko-KR" altLang="en-US" sz="1000" dirty="0"/>
+            </a:p>
+          </p:txBody>
+        </p:sp>
+        <p:sp>
+          <p:nvSpPr>
+            <p:cNvPr id="97" name="오른쪽 화살표 96"/>
+            <p:cNvSpPr/>
+            <p:nvPr/>
+          </p:nvSpPr>
+          <p:spPr>
+            <a:xfrm>
+              <a:off x="4439878" y="1713170"/>
+              <a:ext cx="3600000" cy="216000"/>
+            </a:xfrm>
+            <a:prstGeom prst="rightArrow">
+              <a:avLst>
+                <a:gd name="adj1" fmla="val 72858"/>
+                <a:gd name="adj2" fmla="val 61428"/>
+              </a:avLst>
+            </a:prstGeom>
+          </p:spPr>
+          <p:style>
+            <a:lnRef idx="2">
+              <a:schemeClr val="accent6"/>
+            </a:lnRef>
+            <a:fillRef idx="1">
+              <a:schemeClr val="lt1"/>
+            </a:fillRef>
+            <a:effectRef idx="0">
+              <a:schemeClr val="accent6"/>
+            </a:effectRef>
+            <a:fontRef idx="minor">
+              <a:schemeClr val="dk1"/>
+            </a:fontRef>
+          </p:style>
+          <p:txBody>
+            <a:bodyPr rtlCol="0" anchor="ctr"/>
+            <a:lstStyle/>
+            <a:p>
+              <a:pPr algn="ctr"/>
+              <a:r>
+                <a:rPr lang="en-US" altLang="ko-KR" sz="1000" dirty="0" smtClean="0"/>
+                <a:t>secure channel for photo</a:t>
+              </a:r>
+              <a:endParaRPr lang="ko-KR" altLang="en-US" sz="1000" dirty="0"/>
+            </a:p>
+          </p:txBody>
+        </p:sp>
+        <p:sp>
+          <p:nvSpPr>
+            <p:cNvPr id="98" name="오른쪽 화살표 97"/>
+            <p:cNvSpPr/>
+            <p:nvPr/>
+          </p:nvSpPr>
+          <p:spPr>
+            <a:xfrm>
+              <a:off x="4439878" y="1921218"/>
+              <a:ext cx="3600000" cy="216000"/>
+            </a:xfrm>
+            <a:prstGeom prst="rightArrow">
+              <a:avLst>
+                <a:gd name="adj1" fmla="val 72858"/>
+                <a:gd name="adj2" fmla="val 61428"/>
+              </a:avLst>
+            </a:prstGeom>
+          </p:spPr>
+          <p:style>
+            <a:lnRef idx="2">
+              <a:schemeClr val="accent6"/>
+            </a:lnRef>
+            <a:fillRef idx="1">
+              <a:schemeClr val="lt1"/>
+            </a:fillRef>
+            <a:effectRef idx="0">
+              <a:schemeClr val="accent6"/>
+            </a:effectRef>
+            <a:fontRef idx="minor">
+              <a:schemeClr val="dk1"/>
+            </a:fontRef>
+          </p:style>
+          <p:txBody>
+            <a:bodyPr rtlCol="0" anchor="ctr"/>
+            <a:lstStyle/>
+            <a:p>
+              <a:pPr algn="ctr"/>
+              <a:r>
+                <a:rPr lang="en-US" altLang="ko-KR" sz="1000" dirty="0" smtClean="0"/>
+                <a:t>non-secure channel for photo</a:t>
+              </a:r>
+              <a:endParaRPr lang="ko-KR" altLang="en-US" sz="1000" dirty="0"/>
+            </a:p>
+          </p:txBody>
+        </p:sp>
+        <p:sp>
+          <p:nvSpPr>
+            <p:cNvPr id="99" name="오른쪽 화살표 98"/>
+            <p:cNvSpPr/>
+            <p:nvPr/>
+          </p:nvSpPr>
+          <p:spPr>
+            <a:xfrm>
+              <a:off x="4439878" y="2118440"/>
+              <a:ext cx="3600000" cy="216000"/>
+            </a:xfrm>
+            <a:prstGeom prst="rightArrow">
+              <a:avLst>
+                <a:gd name="adj1" fmla="val 72858"/>
+                <a:gd name="adj2" fmla="val 61428"/>
+              </a:avLst>
+            </a:prstGeom>
+          </p:spPr>
+          <p:style>
+            <a:lnRef idx="2">
+              <a:schemeClr val="accent6"/>
+            </a:lnRef>
+            <a:fillRef idx="1">
+              <a:schemeClr val="lt1"/>
+            </a:fillRef>
+            <a:effectRef idx="0">
+              <a:schemeClr val="accent6"/>
+            </a:effectRef>
+            <a:fontRef idx="minor">
+              <a:schemeClr val="dk1"/>
+            </a:fontRef>
+          </p:style>
+          <p:txBody>
+            <a:bodyPr rtlCol="0" anchor="ctr"/>
+            <a:lstStyle/>
+            <a:p>
+              <a:pPr algn="ctr"/>
+              <a:r>
+                <a:rPr lang="en-US" altLang="ko-KR" sz="1000" dirty="0" smtClean="0"/>
+                <a:t>secure channel for face recognition info</a:t>
+              </a:r>
+              <a:endParaRPr lang="ko-KR" altLang="en-US" sz="1000" dirty="0"/>
+            </a:p>
+          </p:txBody>
+        </p:sp>
+        <p:sp>
+          <p:nvSpPr>
+            <p:cNvPr id="100" name="TextBox 99"/>
+            <p:cNvSpPr txBox="1"/>
+            <p:nvPr/>
+          </p:nvSpPr>
+          <p:spPr>
+            <a:xfrm>
+              <a:off x="5747245" y="1156935"/>
+              <a:ext cx="1117614" cy="246221"/>
+            </a:xfrm>
+            <a:prstGeom prst="rect">
+              <a:avLst/>
+            </a:prstGeom>
+            <a:noFill/>
+          </p:spPr>
+          <p:txBody>
+            <a:bodyPr wrap="none" rtlCol="0">
+              <a:spAutoFit/>
+            </a:bodyPr>
+            <a:lstStyle/>
+            <a:p>
+              <a:r>
+                <a:rPr lang="en-US" altLang="ko-KR" sz="1000" dirty="0" smtClean="0"/>
+                <a:t>TCP Connection</a:t>
+              </a:r>
+            </a:p>
+          </p:txBody>
+        </p:sp>
+      </p:grpSp>
+      <p:pic>
+        <p:nvPicPr>
+          <p:cNvPr id="101" name="그림 100"/>
+          <p:cNvPicPr>
+            <a:picLocks noChangeAspect="1"/>
+          </p:cNvPicPr>
+          <p:nvPr/>
+        </p:nvPicPr>
+        <p:blipFill>
+          <a:blip r:embed="rId5"/>
+          <a:stretch>
+            <a:fillRect/>
+          </a:stretch>
+        </p:blipFill>
+        <p:spPr>
+          <a:xfrm>
+            <a:off x="9394726" y="2739795"/>
+            <a:ext cx="613208" cy="543815"/>
+          </a:xfrm>
+          <a:prstGeom prst="rect">
+            <a:avLst/>
+          </a:prstGeom>
+        </p:spPr>
+      </p:pic>
+      <p:grpSp>
+        <p:nvGrpSpPr>
+          <p:cNvPr id="102" name="그룹 101"/>
+          <p:cNvGrpSpPr/>
+          <p:nvPr/>
+        </p:nvGrpSpPr>
+        <p:grpSpPr>
+          <a:xfrm>
+            <a:off x="9286173" y="3337352"/>
+            <a:ext cx="915836" cy="1975485"/>
+            <a:chOff x="10487297" y="795242"/>
+            <a:chExt cx="1113313" cy="2401448"/>
+          </a:xfrm>
+        </p:grpSpPr>
+        <p:pic>
+          <p:nvPicPr>
+            <p:cNvPr id="103" name="그림 102"/>
+            <p:cNvPicPr>
+              <a:picLocks noChangeAspect="1"/>
+            </p:cNvPicPr>
+            <p:nvPr/>
+          </p:nvPicPr>
+          <p:blipFill>
+            <a:blip r:embed="rId6"/>
+            <a:stretch>
+              <a:fillRect/>
+            </a:stretch>
+          </p:blipFill>
+          <p:spPr>
+            <a:xfrm>
+              <a:off x="10487297" y="1784027"/>
+              <a:ext cx="1113313" cy="1412663"/>
+            </a:xfrm>
+            <a:prstGeom prst="rect">
+              <a:avLst/>
+            </a:prstGeom>
+          </p:spPr>
+        </p:pic>
+        <p:pic>
+          <p:nvPicPr>
+            <p:cNvPr id="104" name="그림 103"/>
+            <p:cNvPicPr>
+              <a:picLocks noChangeAspect="1"/>
+            </p:cNvPicPr>
+            <p:nvPr/>
+          </p:nvPicPr>
+          <p:blipFill>
+            <a:blip r:embed="rId7"/>
+            <a:stretch>
+              <a:fillRect/>
+            </a:stretch>
+          </p:blipFill>
+          <p:spPr>
+            <a:xfrm>
+              <a:off x="10487297" y="795242"/>
+              <a:ext cx="1113313" cy="888799"/>
+            </a:xfrm>
+            <a:prstGeom prst="rect">
+              <a:avLst/>
+            </a:prstGeom>
+          </p:spPr>
+        </p:pic>
+      </p:grpSp>
+      <p:sp>
+        <p:nvSpPr>
+          <p:cNvPr id="105" name="순서도: 자기 디스크 104"/>
           <p:cNvSpPr/>
           <p:nvPr/>
         </p:nvSpPr>
         <p:spPr>
           <a:xfrm>
-            <a:off x="10005748" y="4377446"/>
-            <a:ext cx="2068498" cy="1142995"/>
-          </a:xfrm>
-          <a:prstGeom prst="rect">
+            <a:off x="7252725" y="4561579"/>
+            <a:ext cx="1842569" cy="706406"/>
+          </a:xfrm>
+          <a:prstGeom prst="flowChartMagneticDisk">
             <a:avLst/>
           </a:prstGeom>
         </p:spPr>
@@ -4484,88 +4835,222 @@
           </a:fontRef>
         </p:style>
         <p:txBody>
-          <a:bodyPr rtlCol="0" anchor="ctr"/>
-          <a:lstStyle/>
-          <a:p>
-            <a:pPr algn="r"/>
-            <a:r>
-              <a:rPr lang="en-US" altLang="ko-KR" sz="1050" dirty="0" smtClean="0"/>
-              <a:t>test</a:t>
-            </a:r>
-          </a:p>
-          <a:p>
-            <a:pPr algn="r"/>
-            <a:r>
-              <a:rPr lang="en-US" altLang="ko-KR" sz="1050" dirty="0" smtClean="0"/>
-              <a:t>mode</a:t>
-            </a:r>
-            <a:endParaRPr lang="ko-KR" altLang="en-US" sz="1050" dirty="0"/>
-          </a:p>
-        </p:txBody>
-      </p:sp>
-      <p:sp>
-        <p:nvSpPr>
-          <p:cNvPr id="38" name="직사각형 37"/>
+          <a:bodyPr wrap="none" rtlCol="0" anchor="t"/>
+          <a:lstStyle/>
+          <a:p>
+            <a:endParaRPr lang="en-US" altLang="ko-KR" sz="1000" dirty="0" smtClean="0"/>
+          </a:p>
+        </p:txBody>
+      </p:sp>
+      <p:sp>
+        <p:nvSpPr>
+          <p:cNvPr id="106" name="TextBox 105"/>
+          <p:cNvSpPr txBox="1"/>
+          <p:nvPr/>
+        </p:nvSpPr>
+        <p:spPr>
+          <a:xfrm>
+            <a:off x="7793396" y="4545085"/>
+            <a:ext cx="803425" cy="349946"/>
+          </a:xfrm>
+          <a:prstGeom prst="rect">
+            <a:avLst/>
+          </a:prstGeom>
+          <a:noFill/>
+        </p:spPr>
+        <p:txBody>
+          <a:bodyPr wrap="none" rtlCol="0">
+            <a:spAutoFit/>
+          </a:bodyPr>
+          <a:lstStyle/>
+          <a:p>
+            <a:r>
+              <a:rPr lang="en-US" altLang="ko-KR" sz="1000" dirty="0" smtClean="0"/>
+              <a:t>file system</a:t>
+            </a:r>
+          </a:p>
+        </p:txBody>
+      </p:sp>
+      <p:sp>
+        <p:nvSpPr>
+          <p:cNvPr id="107" name="대각선 방향의 모서리가 잘린 사각형 106"/>
           <p:cNvSpPr/>
           <p:nvPr/>
         </p:nvSpPr>
         <p:spPr>
           <a:xfrm>
-            <a:off x="10005748" y="3000460"/>
-            <a:ext cx="2068498" cy="1294154"/>
-          </a:xfrm>
-          <a:prstGeom prst="rect">
-            <a:avLst/>
+            <a:off x="7570806" y="4906807"/>
+            <a:ext cx="288000" cy="234616"/>
+          </a:xfrm>
+          <a:prstGeom prst="snip2DiagRect">
+            <a:avLst>
+              <a:gd name="adj1" fmla="val 0"/>
+              <a:gd name="adj2" fmla="val 26316"/>
+            </a:avLst>
           </a:prstGeom>
         </p:spPr>
         <p:style>
           <a:lnRef idx="2">
-            <a:schemeClr val="accent6"/>
+            <a:schemeClr val="accent3"/>
           </a:lnRef>
           <a:fillRef idx="1">
             <a:schemeClr val="lt1"/>
           </a:fillRef>
           <a:effectRef idx="0">
-            <a:schemeClr val="accent6"/>
+            <a:schemeClr val="accent3"/>
           </a:effectRef>
           <a:fontRef idx="minor">
             <a:schemeClr val="dk1"/>
           </a:fontRef>
         </p:style>
         <p:txBody>
-          <a:bodyPr rtlCol="0" anchor="ctr"/>
-          <a:lstStyle/>
-          <a:p>
-            <a:pPr algn="r"/>
-            <a:r>
-              <a:rPr lang="en-US" altLang="ko-KR" sz="1050" dirty="0" smtClean="0"/>
-              <a:t>learning</a:t>
-            </a:r>
-          </a:p>
-          <a:p>
-            <a:pPr algn="r"/>
-            <a:r>
-              <a:rPr lang="en-US" altLang="ko-KR" sz="1050" dirty="0" smtClean="0"/>
-              <a:t>mode</a:t>
-            </a:r>
-            <a:endParaRPr lang="ko-KR" altLang="en-US" sz="1050" dirty="0"/>
-          </a:p>
-        </p:txBody>
-      </p:sp>
-      <p:sp>
-        <p:nvSpPr>
-          <p:cNvPr id="39" name="직사각형 38"/>
+          <a:bodyPr wrap="none" rtlCol="0" anchor="ctr"/>
+          <a:lstStyle/>
+          <a:p>
+            <a:pPr algn="ctr"/>
+            <a:r>
+              <a:rPr lang="en-US" altLang="ko-KR" sz="1000" dirty="0" smtClean="0"/>
+              <a:t>CRT</a:t>
+            </a:r>
+            <a:endParaRPr lang="ko-KR" altLang="en-US" sz="1000" dirty="0"/>
+          </a:p>
+        </p:txBody>
+      </p:sp>
+      <p:sp>
+        <p:nvSpPr>
+          <p:cNvPr id="108" name="대각선 방향의 모서리가 잘린 사각형 107"/>
           <p:cNvSpPr/>
           <p:nvPr/>
         </p:nvSpPr>
         <p:spPr>
           <a:xfrm>
-            <a:off x="10107842" y="3452222"/>
-            <a:ext cx="932155" cy="355107"/>
-          </a:xfrm>
-          <a:prstGeom prst="rect">
-            <a:avLst/>
-          </a:prstGeom>
+            <a:off x="7925199" y="4917407"/>
+            <a:ext cx="288000" cy="234616"/>
+          </a:xfrm>
+          <a:prstGeom prst="snip2DiagRect">
+            <a:avLst>
+              <a:gd name="adj1" fmla="val 0"/>
+              <a:gd name="adj2" fmla="val 26316"/>
+            </a:avLst>
+          </a:prstGeom>
+        </p:spPr>
+        <p:style>
+          <a:lnRef idx="2">
+            <a:schemeClr val="accent3"/>
+          </a:lnRef>
+          <a:fillRef idx="1">
+            <a:schemeClr val="lt1"/>
+          </a:fillRef>
+          <a:effectRef idx="0">
+            <a:schemeClr val="accent3"/>
+          </a:effectRef>
+          <a:fontRef idx="minor">
+            <a:schemeClr val="dk1"/>
+          </a:fontRef>
+        </p:style>
+        <p:txBody>
+          <a:bodyPr wrap="none" rtlCol="0" anchor="ctr"/>
+          <a:lstStyle/>
+          <a:p>
+            <a:pPr algn="ctr"/>
+            <a:r>
+              <a:rPr lang="en-US" altLang="ko-KR" sz="1000" dirty="0" smtClean="0"/>
+              <a:t>Key</a:t>
+            </a:r>
+            <a:endParaRPr lang="ko-KR" altLang="en-US" sz="1000" dirty="0"/>
+          </a:p>
+        </p:txBody>
+      </p:sp>
+      <p:sp>
+        <p:nvSpPr>
+          <p:cNvPr id="109" name="대각선 방향의 모서리가 잘린 사각형 108"/>
+          <p:cNvSpPr/>
+          <p:nvPr/>
+        </p:nvSpPr>
+        <p:spPr>
+          <a:xfrm>
+            <a:off x="8306639" y="4917407"/>
+            <a:ext cx="485776" cy="234616"/>
+          </a:xfrm>
+          <a:prstGeom prst="snip2DiagRect">
+            <a:avLst>
+              <a:gd name="adj1" fmla="val 0"/>
+              <a:gd name="adj2" fmla="val 26316"/>
+            </a:avLst>
+          </a:prstGeom>
+        </p:spPr>
+        <p:style>
+          <a:lnRef idx="2">
+            <a:schemeClr val="accent3"/>
+          </a:lnRef>
+          <a:fillRef idx="1">
+            <a:schemeClr val="lt1"/>
+          </a:fillRef>
+          <a:effectRef idx="0">
+            <a:schemeClr val="accent3"/>
+          </a:effectRef>
+          <a:fontRef idx="minor">
+            <a:schemeClr val="dk1"/>
+          </a:fontRef>
+        </p:style>
+        <p:txBody>
+          <a:bodyPr wrap="none" rtlCol="0" anchor="ctr"/>
+          <a:lstStyle/>
+          <a:p>
+            <a:pPr algn="ctr"/>
+            <a:r>
+              <a:rPr lang="en-US" altLang="ko-KR" sz="1000" dirty="0" smtClean="0"/>
+              <a:t>CA CRT</a:t>
+            </a:r>
+            <a:endParaRPr lang="ko-KR" altLang="en-US" sz="1000" dirty="0"/>
+          </a:p>
+        </p:txBody>
+      </p:sp>
+      <p:pic>
+        <p:nvPicPr>
+          <p:cNvPr id="110" name="그림 109"/>
+          <p:cNvPicPr>
+            <a:picLocks noChangeAspect="1"/>
+          </p:cNvPicPr>
+          <p:nvPr/>
+        </p:nvPicPr>
+        <p:blipFill>
+          <a:blip r:embed="rId8"/>
+          <a:stretch>
+            <a:fillRect/>
+          </a:stretch>
+        </p:blipFill>
+        <p:spPr>
+          <a:xfrm>
+            <a:off x="820391" y="3414092"/>
+            <a:ext cx="480002" cy="577217"/>
+          </a:xfrm>
+          <a:prstGeom prst="rect">
+            <a:avLst/>
+          </a:prstGeom>
+        </p:spPr>
+      </p:pic>
+      <p:sp>
+        <p:nvSpPr>
+          <p:cNvPr id="111" name="타원 110"/>
+          <p:cNvSpPr/>
+          <p:nvPr/>
+        </p:nvSpPr>
+        <p:spPr>
+          <a:xfrm>
+            <a:off x="3925172" y="121324"/>
+            <a:ext cx="1243026" cy="914400"/>
+          </a:xfrm>
+          <a:prstGeom prst="ellipse">
+            <a:avLst/>
+          </a:prstGeom>
+          <a:noFill/>
+          <a:ln w="38100">
+            <a:solidFill>
+              <a:srgbClr val="FF0000"/>
+            </a:solidFill>
+            <a:prstDash val="dash"/>
+          </a:ln>
         </p:spPr>
         <p:style>
           <a:lnRef idx="2">
@@ -4588,456 +5073,22 @@
           <a:lstStyle/>
           <a:p>
             <a:pPr algn="ctr"/>
-            <a:r>
-              <a:rPr lang="en-US" altLang="ko-KR" sz="1050" dirty="0" smtClean="0"/>
-              <a:t>capture</a:t>
-            </a:r>
-            <a:endParaRPr lang="ko-KR" altLang="en-US" sz="1050" dirty="0"/>
-          </a:p>
-        </p:txBody>
-      </p:sp>
-      <p:sp>
-        <p:nvSpPr>
-          <p:cNvPr id="40" name="직사각형 39"/>
-          <p:cNvSpPr/>
-          <p:nvPr/>
-        </p:nvSpPr>
-        <p:spPr>
-          <a:xfrm>
-            <a:off x="10107842" y="4506446"/>
-            <a:ext cx="932155" cy="400577"/>
-          </a:xfrm>
-          <a:prstGeom prst="rect">
-            <a:avLst/>
-          </a:prstGeom>
-        </p:spPr>
-        <p:style>
-          <a:lnRef idx="2">
-            <a:schemeClr val="accent1">
-              <a:shade val="50000"/>
-            </a:schemeClr>
-          </a:lnRef>
-          <a:fillRef idx="1">
-            <a:schemeClr val="accent1"/>
-          </a:fillRef>
-          <a:effectRef idx="0">
-            <a:schemeClr val="accent1"/>
-          </a:effectRef>
-          <a:fontRef idx="minor">
-            <a:schemeClr val="lt1"/>
-          </a:fontRef>
-        </p:style>
-        <p:txBody>
-          <a:bodyPr rtlCol="0" anchor="ctr"/>
-          <a:lstStyle/>
-          <a:p>
-            <a:pPr algn="ctr"/>
-            <a:r>
-              <a:rPr lang="en-US" altLang="ko-KR" sz="1050" dirty="0" err="1" smtClean="0"/>
-              <a:t>testRun</a:t>
-            </a:r>
-            <a:endParaRPr lang="en-US" altLang="ko-KR" sz="1050" dirty="0" smtClean="0"/>
-          </a:p>
-          <a:p>
-            <a:pPr algn="ctr"/>
-            <a:r>
-              <a:rPr lang="en-US" altLang="ko-KR" sz="1050" dirty="0" smtClean="0"/>
-              <a:t>button</a:t>
-            </a:r>
-            <a:endParaRPr lang="ko-KR" altLang="en-US" sz="1050" dirty="0"/>
-          </a:p>
-        </p:txBody>
-      </p:sp>
-      <p:sp>
-        <p:nvSpPr>
-          <p:cNvPr id="46" name="직사각형 45"/>
-          <p:cNvSpPr/>
-          <p:nvPr/>
-        </p:nvSpPr>
-        <p:spPr>
-          <a:xfrm>
-            <a:off x="10107842" y="3052244"/>
-            <a:ext cx="932155" cy="355107"/>
-          </a:xfrm>
-          <a:prstGeom prst="rect">
-            <a:avLst/>
-          </a:prstGeom>
-        </p:spPr>
-        <p:style>
-          <a:lnRef idx="2">
-            <a:schemeClr val="accent1">
-              <a:shade val="50000"/>
-            </a:schemeClr>
-          </a:lnRef>
-          <a:fillRef idx="1">
-            <a:schemeClr val="accent1"/>
-          </a:fillRef>
-          <a:effectRef idx="0">
-            <a:schemeClr val="accent1"/>
-          </a:effectRef>
-          <a:fontRef idx="minor">
-            <a:schemeClr val="lt1"/>
-          </a:fontRef>
-        </p:style>
-        <p:txBody>
-          <a:bodyPr rtlCol="0" anchor="ctr"/>
-          <a:lstStyle/>
-          <a:p>
-            <a:pPr algn="ctr"/>
-            <a:r>
-              <a:rPr lang="en-US" altLang="ko-KR" sz="1050" dirty="0" smtClean="0"/>
-              <a:t>input box</a:t>
-            </a:r>
-          </a:p>
-          <a:p>
-            <a:pPr algn="ctr"/>
-            <a:r>
-              <a:rPr lang="en-US" altLang="ko-KR" sz="1050" dirty="0" smtClean="0"/>
-              <a:t>name</a:t>
-            </a:r>
-            <a:endParaRPr lang="ko-KR" altLang="en-US" sz="1050" dirty="0"/>
-          </a:p>
-        </p:txBody>
-      </p:sp>
-      <p:sp>
-        <p:nvSpPr>
-          <p:cNvPr id="50" name="직사각형 49"/>
-          <p:cNvSpPr/>
-          <p:nvPr/>
-        </p:nvSpPr>
-        <p:spPr>
-          <a:xfrm>
-            <a:off x="10107842" y="5689447"/>
-            <a:ext cx="932155" cy="848398"/>
-          </a:xfrm>
-          <a:prstGeom prst="rect">
-            <a:avLst/>
-          </a:prstGeom>
-        </p:spPr>
-        <p:style>
-          <a:lnRef idx="2">
-            <a:schemeClr val="accent1">
-              <a:shade val="50000"/>
-            </a:schemeClr>
-          </a:lnRef>
-          <a:fillRef idx="1">
-            <a:schemeClr val="accent1"/>
-          </a:fillRef>
-          <a:effectRef idx="0">
-            <a:schemeClr val="accent1"/>
-          </a:effectRef>
-          <a:fontRef idx="minor">
-            <a:schemeClr val="lt1"/>
-          </a:fontRef>
-        </p:style>
-        <p:txBody>
-          <a:bodyPr rtlCol="0" anchor="ctr"/>
-          <a:lstStyle/>
-          <a:p>
-            <a:pPr algn="ctr"/>
-            <a:r>
-              <a:rPr lang="en-US" altLang="ko-KR" sz="1050" dirty="0" smtClean="0"/>
-              <a:t>secure</a:t>
-            </a:r>
-          </a:p>
-          <a:p>
-            <a:pPr algn="ctr"/>
-            <a:r>
-              <a:rPr lang="en-US" altLang="ko-KR" sz="1050" dirty="0" smtClean="0"/>
-              <a:t>&lt;&gt; </a:t>
-            </a:r>
-            <a:r>
-              <a:rPr lang="en-US" altLang="ko-KR" sz="1050" dirty="0" err="1" smtClean="0"/>
-              <a:t>nonSecure</a:t>
-            </a:r>
-            <a:endParaRPr lang="en-US" altLang="ko-KR" sz="1050" dirty="0" smtClean="0"/>
-          </a:p>
-          <a:p>
-            <a:pPr algn="ctr"/>
-            <a:r>
-              <a:rPr lang="en-US" altLang="ko-KR" sz="1050" dirty="0" smtClean="0"/>
-              <a:t>toggle button</a:t>
-            </a:r>
-            <a:endParaRPr lang="ko-KR" altLang="en-US" sz="1050" dirty="0"/>
-          </a:p>
-        </p:txBody>
-      </p:sp>
-      <p:sp>
-        <p:nvSpPr>
-          <p:cNvPr id="51" name="직사각형 50"/>
-          <p:cNvSpPr/>
-          <p:nvPr/>
-        </p:nvSpPr>
-        <p:spPr>
-          <a:xfrm>
-            <a:off x="10107842" y="4989855"/>
-            <a:ext cx="932155" cy="400577"/>
-          </a:xfrm>
-          <a:prstGeom prst="rect">
-            <a:avLst/>
-          </a:prstGeom>
-        </p:spPr>
-        <p:style>
-          <a:lnRef idx="2">
-            <a:schemeClr val="accent1">
-              <a:shade val="50000"/>
-            </a:schemeClr>
-          </a:lnRef>
-          <a:fillRef idx="1">
-            <a:schemeClr val="accent1"/>
-          </a:fillRef>
-          <a:effectRef idx="0">
-            <a:schemeClr val="accent1"/>
-          </a:effectRef>
-          <a:fontRef idx="minor">
-            <a:schemeClr val="lt1"/>
-          </a:fontRef>
-        </p:style>
-        <p:txBody>
-          <a:bodyPr rtlCol="0" anchor="ctr"/>
-          <a:lstStyle/>
-          <a:p>
-            <a:pPr algn="ctr"/>
-            <a:r>
-              <a:rPr lang="en-US" altLang="ko-KR" sz="1050" dirty="0" smtClean="0"/>
-              <a:t>run </a:t>
-            </a:r>
-          </a:p>
-          <a:p>
-            <a:pPr algn="ctr"/>
-            <a:r>
-              <a:rPr lang="en-US" altLang="ko-KR" sz="1050" dirty="0" smtClean="0"/>
-              <a:t>button</a:t>
-            </a:r>
-            <a:endParaRPr lang="ko-KR" altLang="en-US" sz="1050" dirty="0"/>
-          </a:p>
-        </p:txBody>
-      </p:sp>
-      <p:sp>
-        <p:nvSpPr>
-          <p:cNvPr id="52" name="직사각형 51"/>
-          <p:cNvSpPr/>
-          <p:nvPr/>
-        </p:nvSpPr>
-        <p:spPr>
-          <a:xfrm>
-            <a:off x="10107842" y="3833219"/>
-            <a:ext cx="932155" cy="355107"/>
-          </a:xfrm>
-          <a:prstGeom prst="rect">
-            <a:avLst/>
-          </a:prstGeom>
-        </p:spPr>
-        <p:style>
-          <a:lnRef idx="2">
-            <a:schemeClr val="accent1">
-              <a:shade val="50000"/>
-            </a:schemeClr>
-          </a:lnRef>
-          <a:fillRef idx="1">
-            <a:schemeClr val="accent1"/>
-          </a:fillRef>
-          <a:effectRef idx="0">
-            <a:schemeClr val="accent1"/>
-          </a:effectRef>
-          <a:fontRef idx="minor">
-            <a:schemeClr val="lt1"/>
-          </a:fontRef>
-        </p:style>
-        <p:txBody>
-          <a:bodyPr rtlCol="0" anchor="ctr"/>
-          <a:lstStyle/>
-          <a:p>
-            <a:pPr algn="ctr"/>
-            <a:r>
-              <a:rPr lang="en-US" altLang="ko-KR" sz="1050" dirty="0" smtClean="0"/>
-              <a:t>confirm</a:t>
-            </a:r>
-            <a:endParaRPr lang="ko-KR" altLang="en-US" sz="1050" dirty="0"/>
-          </a:p>
-        </p:txBody>
-      </p:sp>
-      <p:sp>
-        <p:nvSpPr>
-          <p:cNvPr id="3" name="TextBox 2"/>
-          <p:cNvSpPr txBox="1"/>
-          <p:nvPr/>
-        </p:nvSpPr>
-        <p:spPr>
-          <a:xfrm>
-            <a:off x="1672835" y="1806530"/>
-            <a:ext cx="1308371" cy="369332"/>
-          </a:xfrm>
-          <a:prstGeom prst="rect">
-            <a:avLst/>
-          </a:prstGeom>
-          <a:noFill/>
-        </p:spPr>
-        <p:txBody>
-          <a:bodyPr wrap="none" rtlCol="0">
-            <a:spAutoFit/>
-          </a:bodyPr>
-          <a:lstStyle/>
-          <a:p>
-            <a:r>
-              <a:rPr lang="en-US" altLang="ko-KR" dirty="0" smtClean="0"/>
-              <a:t>user mode</a:t>
-            </a:r>
-            <a:endParaRPr lang="ko-KR" altLang="en-US" dirty="0"/>
-          </a:p>
-        </p:txBody>
-      </p:sp>
-      <p:sp>
-        <p:nvSpPr>
-          <p:cNvPr id="30" name="TextBox 29"/>
-          <p:cNvSpPr txBox="1"/>
-          <p:nvPr/>
-        </p:nvSpPr>
-        <p:spPr>
-          <a:xfrm>
-            <a:off x="8098933" y="1806530"/>
-            <a:ext cx="1523174" cy="369332"/>
-          </a:xfrm>
-          <a:prstGeom prst="rect">
-            <a:avLst/>
-          </a:prstGeom>
-          <a:noFill/>
-        </p:spPr>
-        <p:txBody>
-          <a:bodyPr wrap="none" rtlCol="0">
-            <a:spAutoFit/>
-          </a:bodyPr>
-          <a:lstStyle/>
-          <a:p>
-            <a:r>
-              <a:rPr lang="en-US" altLang="ko-KR" dirty="0" smtClean="0"/>
-              <a:t>admin mode</a:t>
-            </a:r>
-            <a:endParaRPr lang="ko-KR" altLang="en-US" dirty="0"/>
-          </a:p>
-        </p:txBody>
-      </p:sp>
-      <p:pic>
-        <p:nvPicPr>
-          <p:cNvPr id="4" name="그림 3"/>
-          <p:cNvPicPr>
-            <a:picLocks noChangeAspect="1"/>
-          </p:cNvPicPr>
-          <p:nvPr/>
-        </p:nvPicPr>
-        <p:blipFill>
-          <a:blip r:embed="rId3"/>
-          <a:stretch>
-            <a:fillRect/>
-          </a:stretch>
-        </p:blipFill>
-        <p:spPr>
-          <a:xfrm>
-            <a:off x="3485785" y="82264"/>
-            <a:ext cx="4507509" cy="1488794"/>
-          </a:xfrm>
-          <a:prstGeom prst="rect">
-            <a:avLst/>
-          </a:prstGeom>
-        </p:spPr>
-      </p:pic>
-      <p:sp>
-        <p:nvSpPr>
-          <p:cNvPr id="5" name="타원 4"/>
-          <p:cNvSpPr/>
-          <p:nvPr/>
-        </p:nvSpPr>
-        <p:spPr>
-          <a:xfrm>
-            <a:off x="5969432" y="113016"/>
-            <a:ext cx="1243026" cy="914400"/>
-          </a:xfrm>
-          <a:prstGeom prst="ellipse">
-            <a:avLst/>
-          </a:prstGeom>
-          <a:noFill/>
-          <a:ln w="38100">
-            <a:solidFill>
-              <a:srgbClr val="FF0000"/>
-            </a:solidFill>
-            <a:prstDash val="dash"/>
-          </a:ln>
-        </p:spPr>
-        <p:style>
-          <a:lnRef idx="2">
-            <a:schemeClr val="accent1">
-              <a:shade val="50000"/>
-            </a:schemeClr>
-          </a:lnRef>
-          <a:fillRef idx="1">
-            <a:schemeClr val="accent1"/>
-          </a:fillRef>
-          <a:effectRef idx="0">
-            <a:schemeClr val="accent1"/>
-          </a:effectRef>
-          <a:fontRef idx="minor">
-            <a:schemeClr val="lt1"/>
-          </a:fontRef>
-        </p:style>
-        <p:txBody>
-          <a:bodyPr rtlCol="0" anchor="ctr"/>
-          <a:lstStyle/>
-          <a:p>
-            <a:pPr algn="ctr"/>
             <a:endParaRPr lang="ko-KR" altLang="en-US"/>
           </a:p>
         </p:txBody>
       </p:sp>
       <p:cxnSp>
         <p:nvCxnSpPr>
-          <p:cNvPr id="10" name="직선 화살표 연결선 9"/>
+          <p:cNvPr id="112" name="직선 화살표 연결선 111"/>
           <p:cNvCxnSpPr>
-            <a:stCxn id="5" idx="4"/>
+            <a:stCxn id="111" idx="4"/>
           </p:cNvCxnSpPr>
           <p:nvPr/>
         </p:nvCxnSpPr>
         <p:spPr>
           <a:xfrm flipH="1">
-            <a:off x="3164441" y="1027416"/>
-            <a:ext cx="3426504" cy="768808"/>
-          </a:xfrm>
-          <a:prstGeom prst="straightConnector1">
-            <a:avLst/>
-          </a:prstGeom>
-          <a:ln w="57150">
-            <a:solidFill>
-              <a:srgbClr val="FF0000"/>
-            </a:solidFill>
-            <a:tailEnd type="triangle"/>
-          </a:ln>
-        </p:spPr>
-        <p:style>
-          <a:lnRef idx="1">
-            <a:schemeClr val="accent1"/>
-          </a:lnRef>
-          <a:fillRef idx="0">
-            <a:schemeClr val="accent1"/>
-          </a:fillRef>
-          <a:effectRef idx="0">
-            <a:schemeClr val="accent1"/>
-          </a:effectRef>
-          <a:fontRef idx="minor">
-            <a:schemeClr val="tx1"/>
-          </a:fontRef>
-        </p:style>
-      </p:cxnSp>
-      <p:cxnSp>
-        <p:nvCxnSpPr>
-          <p:cNvPr id="34" name="직선 화살표 연결선 33"/>
-          <p:cNvCxnSpPr>
-            <a:stCxn id="5" idx="4"/>
-          </p:cNvCxnSpPr>
-          <p:nvPr/>
-        </p:nvCxnSpPr>
-        <p:spPr>
-          <a:xfrm>
-            <a:off x="6590945" y="1027416"/>
-            <a:ext cx="1723693" cy="721768"/>
+            <a:off x="3485785" y="1035724"/>
+            <a:ext cx="1060900" cy="1477439"/>
           </a:xfrm>
           <a:prstGeom prst="straightConnector1">
             <a:avLst/>
@@ -5538,15 +5589,7 @@
           <a:p>
             <a:r>
               <a:rPr lang="en-US" altLang="ko-KR" sz="1000" dirty="0" smtClean="0"/>
-              <a:t>the </a:t>
-            </a:r>
-            <a:r>
-              <a:rPr lang="en-US" altLang="ko-KR" sz="1000" dirty="0" smtClean="0"/>
-              <a:t>5000 </a:t>
-            </a:r>
-            <a:r>
-              <a:rPr lang="en-US" altLang="ko-KR" sz="1000" dirty="0" smtClean="0"/>
-              <a:t>port number is dedicated</a:t>
+              <a:t>the 5000 port number is dedicated</a:t>
             </a:r>
           </a:p>
           <a:p>
@@ -5992,15 +6035,7 @@
             <a:pPr algn="r"/>
             <a:r>
               <a:rPr lang="en-US" altLang="ko-KR" sz="1000" dirty="0" smtClean="0"/>
-              <a:t>send </a:t>
-            </a:r>
-            <a:r>
-              <a:rPr lang="en-US" altLang="ko-KR" sz="1000" dirty="0" smtClean="0"/>
-              <a:t>TCP port1</a:t>
-            </a:r>
-            <a:r>
-              <a:rPr lang="en-US" altLang="ko-KR" sz="1000" dirty="0" smtClean="0"/>
-              <a:t>, port2</a:t>
+              <a:t>send TCP port1, port2</a:t>
             </a:r>
             <a:endParaRPr lang="ko-KR" altLang="en-US" sz="1000" dirty="0"/>
           </a:p>
@@ -6543,11 +6578,7 @@
             <a:pPr algn="r"/>
             <a:r>
               <a:rPr lang="en-US" altLang="ko-KR" sz="1000" dirty="0" smtClean="0"/>
-              <a:t>face </a:t>
-            </a:r>
-            <a:r>
-              <a:rPr lang="en-US" altLang="ko-KR" sz="1000" dirty="0" smtClean="0"/>
-              <a:t>recognition </a:t>
+              <a:t>face recognition </a:t>
             </a:r>
             <a:r>
               <a:rPr lang="en-US" altLang="ko-KR" sz="1000" dirty="0"/>
@@ -6879,6 +6910,50 @@
               <a:rPr lang="en-US" altLang="ko-KR" sz="1000" dirty="0" smtClean="0"/>
               <a:t>run camera, start AI analysis</a:t>
             </a:r>
+          </a:p>
+        </p:txBody>
+      </p:sp>
+      <p:sp>
+        <p:nvSpPr>
+          <p:cNvPr id="52" name="직사각형 51"/>
+          <p:cNvSpPr/>
+          <p:nvPr/>
+        </p:nvSpPr>
+        <p:spPr>
+          <a:xfrm>
+            <a:off x="91129" y="125974"/>
+            <a:ext cx="12100871" cy="6732025"/>
+          </a:xfrm>
+          <a:prstGeom prst="rect">
+            <a:avLst/>
+          </a:prstGeom>
+          <a:ln>
+            <a:prstDash val="dash"/>
+          </a:ln>
+        </p:spPr>
+        <p:style>
+          <a:lnRef idx="2">
+            <a:schemeClr val="accent2"/>
+          </a:lnRef>
+          <a:fillRef idx="1">
+            <a:schemeClr val="lt1"/>
+          </a:fillRef>
+          <a:effectRef idx="0">
+            <a:schemeClr val="accent2"/>
+          </a:effectRef>
+          <a:fontRef idx="minor">
+            <a:schemeClr val="dk1"/>
+          </a:fontRef>
+        </p:style>
+        <p:txBody>
+          <a:bodyPr rtlCol="0" anchor="t"/>
+          <a:lstStyle/>
+          <a:p>
+            <a:r>
+              <a:rPr lang="en-US" altLang="ko-KR" sz="1400" b="1" dirty="0" smtClean="0"/>
+              <a:t>Deprecated</a:t>
+            </a:r>
+            <a:endParaRPr lang="ko-KR" altLang="en-US" sz="1000" dirty="0"/>
           </a:p>
         </p:txBody>
       </p:sp>
@@ -7093,7 +7168,6 @@
               <a:rPr lang="en-US" altLang="ko-KR" sz="1000" dirty="0" smtClean="0"/>
               <a:t>admin login process</a:t>
             </a:r>
-            <a:endParaRPr lang="en-US" altLang="ko-KR" sz="1000" dirty="0" smtClean="0"/>
           </a:p>
           <a:p>
             <a:r>
@@ -8547,6 +8621,50 @@
             <a:r>
               <a:rPr lang="en-US" altLang="ko-KR" sz="1000" dirty="0"/>
               <a:t>recognition result</a:t>
+            </a:r>
+            <a:endParaRPr lang="ko-KR" altLang="en-US" sz="1000" dirty="0"/>
+          </a:p>
+        </p:txBody>
+      </p:sp>
+      <p:sp>
+        <p:nvSpPr>
+          <p:cNvPr id="51" name="직사각형 50"/>
+          <p:cNvSpPr/>
+          <p:nvPr/>
+        </p:nvSpPr>
+        <p:spPr>
+          <a:xfrm>
+            <a:off x="91129" y="125974"/>
+            <a:ext cx="12100871" cy="6732025"/>
+          </a:xfrm>
+          <a:prstGeom prst="rect">
+            <a:avLst/>
+          </a:prstGeom>
+          <a:ln>
+            <a:prstDash val="dash"/>
+          </a:ln>
+        </p:spPr>
+        <p:style>
+          <a:lnRef idx="2">
+            <a:schemeClr val="accent2"/>
+          </a:lnRef>
+          <a:fillRef idx="1">
+            <a:schemeClr val="lt1"/>
+          </a:fillRef>
+          <a:effectRef idx="0">
+            <a:schemeClr val="accent2"/>
+          </a:effectRef>
+          <a:fontRef idx="minor">
+            <a:schemeClr val="dk1"/>
+          </a:fontRef>
+        </p:style>
+        <p:txBody>
+          <a:bodyPr rtlCol="0" anchor="t"/>
+          <a:lstStyle/>
+          <a:p>
+            <a:r>
+              <a:rPr lang="en-US" altLang="ko-KR" sz="1400" b="1" dirty="0" smtClean="0"/>
+              <a:t>Deprecated</a:t>
             </a:r>
             <a:endParaRPr lang="ko-KR" altLang="en-US" sz="1000" dirty="0"/>
           </a:p>
@@ -8631,20 +8749,14 @@
             </a:r>
             <a:r>
               <a:rPr lang="en-US" altLang="ko-KR" sz="1400" b="1" dirty="0" smtClean="0"/>
-              <a:t> </a:t>
-            </a:r>
-            <a:r>
-              <a:rPr lang="en-US" altLang="ko-KR" sz="1400" b="1" dirty="0" smtClean="0"/>
-              <a:t>7</a:t>
-            </a:r>
-            <a:endParaRPr lang="en-US" altLang="ko-KR" sz="1400" b="1" dirty="0" smtClean="0"/>
+              <a:t> 7</a:t>
+            </a:r>
           </a:p>
           <a:p>
             <a:r>
               <a:rPr lang="en-US" altLang="ko-KR" sz="1000" dirty="0" smtClean="0"/>
               <a:t>run mode</a:t>
             </a:r>
-            <a:endParaRPr lang="en-US" altLang="ko-KR" sz="1000" dirty="0" smtClean="0"/>
           </a:p>
         </p:txBody>
       </p:sp>
@@ -8690,13 +8802,8 @@
             </a:r>
             <a:r>
               <a:rPr lang="en-US" altLang="ko-KR" sz="1400" b="1" dirty="0" smtClean="0"/>
-              <a:t> </a:t>
-            </a:r>
-            <a:r>
-              <a:rPr lang="en-US" altLang="ko-KR" sz="1400" b="1" dirty="0" smtClean="0"/>
-              <a:t>6</a:t>
-            </a:r>
-            <a:endParaRPr lang="en-US" altLang="ko-KR" sz="1400" b="1" dirty="0" smtClean="0"/>
+              <a:t> 6</a:t>
+            </a:r>
           </a:p>
           <a:p>
             <a:r>
@@ -8705,13 +8812,8 @@
             </a:r>
             <a:r>
               <a:rPr lang="en-US" altLang="ko-KR" sz="1000" dirty="0" smtClean="0"/>
-              <a:t> </a:t>
-            </a:r>
-            <a:r>
-              <a:rPr lang="en-US" altLang="ko-KR" sz="1000" dirty="0" smtClean="0"/>
-              <a:t>mode</a:t>
-            </a:r>
-            <a:endParaRPr lang="en-US" altLang="ko-KR" sz="1000" dirty="0" smtClean="0"/>
+              <a:t> mode</a:t>
+            </a:r>
           </a:p>
         </p:txBody>
       </p:sp>
@@ -9184,11 +9286,7 @@
           <a:p>
             <a:r>
               <a:rPr lang="en-US" altLang="ko-KR" sz="1000" dirty="0" smtClean="0"/>
-              <a:t>send </a:t>
-            </a:r>
-            <a:r>
-              <a:rPr lang="en-US" altLang="ko-KR" sz="1000" dirty="0" smtClean="0"/>
-              <a:t>‘</a:t>
+              <a:t>send ‘</a:t>
             </a:r>
             <a:r>
               <a:rPr lang="en-US" altLang="ko-KR" sz="1000" dirty="0" err="1" smtClean="0"/>
@@ -9196,11 +9294,7 @@
             </a:r>
             <a:r>
               <a:rPr lang="en-US" altLang="ko-KR" sz="1000" dirty="0" smtClean="0"/>
-              <a:t>’ </a:t>
-            </a:r>
-            <a:r>
-              <a:rPr lang="en-US" altLang="ko-KR" sz="1000" dirty="0" smtClean="0"/>
-              <a:t>command</a:t>
+              <a:t>’ command</a:t>
             </a:r>
             <a:endParaRPr lang="ko-KR" altLang="en-US" sz="1000" dirty="0"/>
           </a:p>
@@ -9540,11 +9634,7 @@
           <a:p>
             <a:r>
               <a:rPr lang="en-US" altLang="ko-KR" sz="1000" dirty="0" smtClean="0"/>
-              <a:t>send </a:t>
-            </a:r>
-            <a:r>
-              <a:rPr lang="en-US" altLang="ko-KR" sz="1000" dirty="0" smtClean="0"/>
-              <a:t>‘</a:t>
+              <a:t>send ‘</a:t>
             </a:r>
             <a:r>
               <a:rPr lang="en-US" altLang="ko-KR" sz="1000" dirty="0" err="1" smtClean="0"/>
@@ -9552,11 +9642,7 @@
             </a:r>
             <a:r>
               <a:rPr lang="en-US" altLang="ko-KR" sz="1000" dirty="0" smtClean="0"/>
-              <a:t>’ </a:t>
-            </a:r>
-            <a:r>
-              <a:rPr lang="en-US" altLang="ko-KR" sz="1000" dirty="0" smtClean="0"/>
-              <a:t>command</a:t>
+              <a:t>’ command</a:t>
             </a:r>
             <a:endParaRPr lang="ko-KR" altLang="en-US" sz="1000" dirty="0"/>
           </a:p>
@@ -9663,6 +9749,50 @@
               <a:t> file</a:t>
             </a:r>
             <a:endParaRPr lang="en-US" altLang="ko-KR" sz="1000" b="1" dirty="0" smtClean="0"/>
+          </a:p>
+        </p:txBody>
+      </p:sp>
+      <p:sp>
+        <p:nvSpPr>
+          <p:cNvPr id="31" name="직사각형 30"/>
+          <p:cNvSpPr/>
+          <p:nvPr/>
+        </p:nvSpPr>
+        <p:spPr>
+          <a:xfrm>
+            <a:off x="91129" y="125974"/>
+            <a:ext cx="12100871" cy="6732025"/>
+          </a:xfrm>
+          <a:prstGeom prst="rect">
+            <a:avLst/>
+          </a:prstGeom>
+          <a:ln>
+            <a:prstDash val="dash"/>
+          </a:ln>
+        </p:spPr>
+        <p:style>
+          <a:lnRef idx="2">
+            <a:schemeClr val="accent2"/>
+          </a:lnRef>
+          <a:fillRef idx="1">
+            <a:schemeClr val="lt1"/>
+          </a:fillRef>
+          <a:effectRef idx="0">
+            <a:schemeClr val="accent2"/>
+          </a:effectRef>
+          <a:fontRef idx="minor">
+            <a:schemeClr val="dk1"/>
+          </a:fontRef>
+        </p:style>
+        <p:txBody>
+          <a:bodyPr rtlCol="0" anchor="t"/>
+          <a:lstStyle/>
+          <a:p>
+            <a:r>
+              <a:rPr lang="en-US" altLang="ko-KR" sz="1400" b="1" dirty="0" smtClean="0"/>
+              <a:t>Deprecated</a:t>
+            </a:r>
+            <a:endParaRPr lang="ko-KR" altLang="en-US" sz="1000" dirty="0"/>
           </a:p>
         </p:txBody>
       </p:sp>
@@ -9758,7 +9888,6 @@
               <a:rPr lang="en-US" altLang="ko-KR" sz="1000" dirty="0" smtClean="0"/>
               <a:t>secure mode</a:t>
             </a:r>
-            <a:endParaRPr lang="en-US" altLang="ko-KR" sz="1000" dirty="0" smtClean="0"/>
           </a:p>
         </p:txBody>
       </p:sp>
@@ -9819,13 +9948,8 @@
             </a:r>
             <a:r>
               <a:rPr lang="en-US" altLang="ko-KR" sz="1000" dirty="0" smtClean="0"/>
-              <a:t> </a:t>
-            </a:r>
-            <a:r>
-              <a:rPr lang="en-US" altLang="ko-KR" sz="1000" dirty="0" smtClean="0"/>
-              <a:t>mode</a:t>
-            </a:r>
-            <a:endParaRPr lang="en-US" altLang="ko-KR" sz="1000" dirty="0" smtClean="0"/>
+              <a:t> mode</a:t>
+            </a:r>
           </a:p>
         </p:txBody>
       </p:sp>
@@ -10364,11 +10488,7 @@
           <a:p>
             <a:r>
               <a:rPr lang="en-US" altLang="ko-KR" sz="1000" dirty="0" smtClean="0"/>
-              <a:t>send </a:t>
-            </a:r>
-            <a:r>
-              <a:rPr lang="en-US" altLang="ko-KR" sz="1000" dirty="0" smtClean="0"/>
-              <a:t>‘</a:t>
+              <a:t>send ‘</a:t>
             </a:r>
             <a:r>
               <a:rPr lang="en-US" altLang="ko-KR" sz="1000" dirty="0" err="1" smtClean="0"/>
@@ -10376,11 +10496,7 @@
             </a:r>
             <a:r>
               <a:rPr lang="en-US" altLang="ko-KR" sz="1000" dirty="0" smtClean="0"/>
-              <a:t>’ </a:t>
-            </a:r>
-            <a:r>
-              <a:rPr lang="en-US" altLang="ko-KR" sz="1000" dirty="0" smtClean="0"/>
-              <a:t>command</a:t>
+              <a:t>’ command</a:t>
             </a:r>
             <a:endParaRPr lang="ko-KR" altLang="en-US" sz="1000" dirty="0"/>
           </a:p>
@@ -10720,11 +10836,7 @@
           <a:p>
             <a:r>
               <a:rPr lang="en-US" altLang="ko-KR" sz="1000" dirty="0" smtClean="0"/>
-              <a:t>send </a:t>
-            </a:r>
-            <a:r>
-              <a:rPr lang="en-US" altLang="ko-KR" sz="1000" dirty="0" smtClean="0"/>
-              <a:t>‘</a:t>
+              <a:t>send ‘</a:t>
             </a:r>
             <a:r>
               <a:rPr lang="en-US" altLang="ko-KR" sz="1000" dirty="0" err="1" smtClean="0"/>
@@ -10732,11 +10844,7 @@
             </a:r>
             <a:r>
               <a:rPr lang="en-US" altLang="ko-KR" sz="1000" dirty="0" smtClean="0"/>
-              <a:t>’ </a:t>
-            </a:r>
-            <a:r>
-              <a:rPr lang="en-US" altLang="ko-KR" sz="1000" dirty="0" smtClean="0"/>
-              <a:t>command</a:t>
+              <a:t>’ command</a:t>
             </a:r>
             <a:endParaRPr lang="ko-KR" altLang="en-US" sz="1000" dirty="0"/>
           </a:p>
@@ -10772,7 +10880,6 @@
               <a:rPr lang="en-US" altLang="ko-KR" sz="1000" b="1" dirty="0" smtClean="0"/>
               <a:t>port2 (TCP Connection 3)</a:t>
             </a:r>
-            <a:endParaRPr lang="en-US" altLang="ko-KR" sz="1000" b="1" dirty="0" smtClean="0"/>
           </a:p>
         </p:txBody>
       </p:sp>
@@ -10806,7 +10913,6 @@
               <a:rPr lang="en-US" altLang="ko-KR" sz="1000" b="1" dirty="0" smtClean="0"/>
               <a:t>port1 (TCP Connection 2)</a:t>
             </a:r>
-            <a:endParaRPr lang="en-US" altLang="ko-KR" sz="1000" b="1" dirty="0" smtClean="0"/>
           </a:p>
         </p:txBody>
       </p:sp>
@@ -10849,7 +10955,6 @@
               <a:rPr lang="en-US" altLang="ko-KR" sz="1000" dirty="0" smtClean="0"/>
               <a:t>button</a:t>
             </a:r>
-            <a:endParaRPr lang="en-US" altLang="ko-KR" sz="1000" dirty="0" smtClean="0"/>
           </a:p>
           <a:p>
             <a:pPr algn="r"/>
@@ -10863,11 +10968,7 @@
             </a:r>
             <a:r>
               <a:rPr lang="en-US" altLang="ko-KR" sz="1000" dirty="0" smtClean="0"/>
-              <a:t> </a:t>
-            </a:r>
-            <a:r>
-              <a:rPr lang="en-US" altLang="ko-KR" sz="1000" dirty="0" smtClean="0"/>
-              <a:t>button</a:t>
+              <a:t> button</a:t>
             </a:r>
             <a:endParaRPr lang="ko-KR" altLang="en-US" sz="1000" dirty="0"/>
           </a:p>
@@ -10908,7 +11009,6 @@
               <a:rPr lang="en-US" altLang="ko-KR" sz="1000" dirty="0" smtClean="0"/>
               <a:t>button</a:t>
             </a:r>
-            <a:endParaRPr lang="en-US" altLang="ko-KR" sz="1000" dirty="0" smtClean="0"/>
           </a:p>
           <a:p>
             <a:pPr algn="r"/>
@@ -10922,11 +11022,51 @@
             </a:r>
             <a:r>
               <a:rPr lang="en-US" altLang="ko-KR" sz="1000" dirty="0" smtClean="0"/>
-              <a:t> </a:t>
-            </a:r>
-            <a:r>
-              <a:rPr lang="en-US" altLang="ko-KR" sz="1000" dirty="0" smtClean="0"/>
-              <a:t>button</a:t>
+              <a:t> button</a:t>
+            </a:r>
+            <a:endParaRPr lang="ko-KR" altLang="en-US" sz="1000" dirty="0"/>
+          </a:p>
+        </p:txBody>
+      </p:sp>
+      <p:sp>
+        <p:nvSpPr>
+          <p:cNvPr id="34" name="직사각형 33"/>
+          <p:cNvSpPr/>
+          <p:nvPr/>
+        </p:nvSpPr>
+        <p:spPr>
+          <a:xfrm>
+            <a:off x="91129" y="125974"/>
+            <a:ext cx="12100871" cy="6732025"/>
+          </a:xfrm>
+          <a:prstGeom prst="rect">
+            <a:avLst/>
+          </a:prstGeom>
+          <a:ln>
+            <a:prstDash val="dash"/>
+          </a:ln>
+        </p:spPr>
+        <p:style>
+          <a:lnRef idx="2">
+            <a:schemeClr val="accent2"/>
+          </a:lnRef>
+          <a:fillRef idx="1">
+            <a:schemeClr val="lt1"/>
+          </a:fillRef>
+          <a:effectRef idx="0">
+            <a:schemeClr val="accent2"/>
+          </a:effectRef>
+          <a:fontRef idx="minor">
+            <a:schemeClr val="dk1"/>
+          </a:fontRef>
+        </p:style>
+        <p:txBody>
+          <a:bodyPr rtlCol="0" anchor="t"/>
+          <a:lstStyle/>
+          <a:p>
+            <a:r>
+              <a:rPr lang="en-US" altLang="ko-KR" sz="1400" b="1" dirty="0" smtClean="0"/>
+              <a:t>Deprecated</a:t>
             </a:r>
             <a:endParaRPr lang="ko-KR" altLang="en-US" sz="1000" dirty="0"/>
           </a:p>

</xml_diff>